<commit_message>
Fixes for convert and insert texxt into a graphic image slides
</commit_message>
<xml_diff>
--- a/Courses/Computer-Modeling-and-IT/Computer-Modeling-and-IT-5-Class/14-Convert-and-Insert-Text-Into-a-Graphic-Image/14-Convert-and-Insert-Text-Into-a-Graphic-Image.pptx
+++ b/Courses/Computer-Modeling-and-IT/Computer-Modeling-and-IT-5-Class/14-Convert-and-Insert-Text-Into-a-Graphic-Image/14-Convert-and-Insert-Text-Into-a-Graphic-Image.pptx
@@ -301,7 +301,7 @@
           <a:p>
             <a:fld id="{4E087215-0C8F-4762-A664-737A353EC9A4}" type="datetimeFigureOut">
               <a:rPr lang="bg-BG" smtClean="0"/>
-              <a:t>18.11.2023 г.</a:t>
+              <a:t>29.11.23 г.</a:t>
             </a:fld>
             <a:endParaRPr lang="bg-BG"/>
           </a:p>
@@ -497,7 +497,7 @@
           <a:p>
             <a:fld id="{72D84649-876A-46C9-8472-14CB09C070D8}" type="datetimeFigureOut">
               <a:rPr lang="en-US" smtClean="0"/>
-              <a:t>11/18/2023</a:t>
+              <a:t>11/29/23</a:t>
             </a:fld>
             <a:endParaRPr lang="en-US"/>
           </a:p>
@@ -4237,7 +4237,7 @@
             <a:fld id="{055373AC-9AA7-423B-BA00-BA1C74164DBD}" type="datetime1">
               <a:rPr lang="en-US" smtClean="0"/>
               <a:pPr/>
-              <a:t>11/18/2023</a:t>
+              <a:t>11/29/23</a:t>
             </a:fld>
             <a:endParaRPr lang="en-US" dirty="0"/>
           </a:p>
@@ -7520,41 +7520,6 @@
       </p:sp>
       <p:sp>
         <p:nvSpPr>
-          <p:cNvPr id="3" name="Presentation Subtitle">
-            <a:extLst>
-              <a:ext uri="{FF2B5EF4-FFF2-40B4-BE49-F238E27FC236}">
-                <a16:creationId xmlns:a16="http://schemas.microsoft.com/office/drawing/2014/main" id="{A004DC04-DA2A-41C0-8578-4B8D2F08EA7D}"/>
-              </a:ext>
-            </a:extLst>
-          </p:cNvPr>
-          <p:cNvSpPr>
-            <a:spLocks noGrp="1"/>
-          </p:cNvSpPr>
-          <p:nvPr>
-            <p:ph type="subTitle" idx="1"/>
-          </p:nvPr>
-        </p:nvSpPr>
-        <p:spPr>
-          <a:xfrm>
-            <a:off x="554746" y="1918853"/>
-            <a:ext cx="11083636" cy="614702"/>
-          </a:xfrm>
-        </p:spPr>
-        <p:txBody>
-          <a:bodyPr>
-            <a:normAutofit lnSpcReduction="10000"/>
-          </a:bodyPr>
-          <a:lstStyle/>
-          <a:p>
-            <a:r>
-              <a:rPr lang="en-US" dirty="0" smtClean="0"/>
-              <a:t>TODO</a:t>
-            </a:r>
-          </a:p>
-        </p:txBody>
-      </p:sp>
-      <p:sp>
-        <p:nvSpPr>
           <p:cNvPr id="2" name="Presentation Title">
             <a:extLst>
               <a:ext uri="{FF2B5EF4-FFF2-40B4-BE49-F238E27FC236}">
@@ -7582,12 +7547,8 @@
           <a:lstStyle/>
           <a:p>
             <a:r>
-              <a:rPr lang="ru-RU" dirty="0" smtClean="0"/>
-              <a:t>Преобразуване и вмъкване </a:t>
-            </a:r>
-            <a:r>
               <a:rPr lang="ru-RU" dirty="0"/>
-              <a:t>на текст в графично изображение</a:t>
+              <a:t>Преобразуване и вмъкване на текст в графично изображение</a:t>
             </a:r>
             <a:endParaRPr lang="en-US" dirty="0"/>
           </a:p>
@@ -7609,14 +7570,13 @@
               </a:ext>
             </a:extLst>
           </a:blip>
-          <a:stretch>
-            <a:fillRect/>
-          </a:stretch>
+          <a:srcRect/>
+          <a:stretch/>
         </p:blipFill>
         <p:spPr>
           <a:xfrm>
-            <a:off x="554746" y="3024977"/>
-            <a:ext cx="1769683" cy="825597"/>
+            <a:off x="554746" y="3040926"/>
+            <a:ext cx="1769683" cy="793699"/>
           </a:xfrm>
           <a:prstGeom prst="rect">
             <a:avLst/>
@@ -7872,18 +7832,13 @@
               <a:buSzPct val="70000"/>
             </a:pPr>
             <a:r>
-              <a:rPr lang="en-US" sz="2400" b="1" dirty="0" smtClean="0">
+              <a:rPr lang="en-US" sz="2400" b="1" dirty="0">
                 <a:solidFill>
                   <a:schemeClr val="bg2"/>
                 </a:solidFill>
               </a:rPr>
               <a:t>Text</a:t>
             </a:r>
-            <a:endParaRPr lang="en-US" sz="2400" b="1" dirty="0">
-              <a:solidFill>
-                <a:schemeClr val="bg2"/>
-              </a:solidFill>
-            </a:endParaRPr>
           </a:p>
         </p:txBody>
       </p:sp>
@@ -7925,18 +7880,13 @@
               <a:buSzPct val="70000"/>
             </a:pPr>
             <a:r>
-              <a:rPr lang="en-US" sz="2400" b="1" dirty="0" smtClean="0">
+              <a:rPr lang="en-US" sz="2400" b="1" dirty="0">
                 <a:solidFill>
                   <a:schemeClr val="bg2"/>
                 </a:solidFill>
               </a:rPr>
               <a:t>Text</a:t>
             </a:r>
-            <a:endParaRPr lang="en-US" sz="2400" b="1" dirty="0">
-              <a:solidFill>
-                <a:schemeClr val="bg2"/>
-              </a:solidFill>
-            </a:endParaRPr>
           </a:p>
         </p:txBody>
       </p:sp>
@@ -7958,13 +7908,6 @@
       <p:transition spd="slow" advClick="0" advTm="5000"/>
     </mc:Fallback>
   </mc:AlternateContent>
-  <p:timing>
-    <p:tnLst>
-      <p:par>
-        <p:cTn id="1" dur="indefinite" restart="never" nodeType="tmRoot"/>
-      </p:par>
-    </p:tnLst>
-  </p:timing>
 </p:sld>
 </file>
 
@@ -8007,11 +7950,7 @@
           <a:p>
             <a:r>
               <a:rPr lang="bg-BG" dirty="0"/>
-              <a:t>Пробразуване на графично </a:t>
-            </a:r>
-            <a:r>
-              <a:rPr lang="bg-BG" dirty="0" smtClean="0"/>
-              <a:t>изображение</a:t>
+              <a:t>Пробразуване на графично изображение</a:t>
             </a:r>
             <a:endParaRPr lang="en-US" dirty="0"/>
           </a:p>
@@ -8072,7 +8011,7 @@
           <a:p>
             <a:pPr algn="ctr"/>
             <a:r>
-              <a:rPr lang="en-US" sz="2800" b="1" dirty="0" smtClean="0">
+              <a:rPr lang="en-US" sz="2800" b="1" dirty="0">
                 <a:solidFill>
                   <a:srgbClr val="FFFFFF"/>
                 </a:solidFill>
@@ -8086,18 +8025,6 @@
               </a:rPr>
               <a:t>Lorem</a:t>
             </a:r>
-            <a:endParaRPr lang="en-US" sz="2800" b="1" dirty="0">
-              <a:solidFill>
-                <a:srgbClr val="FFFFFF"/>
-              </a:solidFill>
-              <a:effectLst>
-                <a:outerShdw blurRad="38100" dist="38100" dir="2700000" algn="tl">
-                  <a:srgbClr val="000000">
-                    <a:alpha val="43137"/>
-                  </a:srgbClr>
-                </a:outerShdw>
-              </a:effectLst>
-            </a:endParaRPr>
           </a:p>
         </p:txBody>
       </p:sp>
@@ -8156,7 +8083,7 @@
           <a:p>
             <a:pPr algn="ctr"/>
             <a:r>
-              <a:rPr lang="en-US" sz="2800" b="1" dirty="0" smtClean="0">
+              <a:rPr lang="en-US" sz="2800" b="1" dirty="0">
                 <a:solidFill>
                   <a:srgbClr val="FFFFFF"/>
                 </a:solidFill>
@@ -8170,18 +8097,6 @@
               </a:rPr>
               <a:t>Lorem</a:t>
             </a:r>
-            <a:endParaRPr lang="en-US" sz="2800" b="1" dirty="0">
-              <a:solidFill>
-                <a:srgbClr val="FFFFFF"/>
-              </a:solidFill>
-              <a:effectLst>
-                <a:outerShdw blurRad="38100" dist="38100" dir="2700000" algn="tl">
-                  <a:srgbClr val="000000">
-                    <a:alpha val="43137"/>
-                  </a:srgbClr>
-                </a:outerShdw>
-              </a:effectLst>
-            </a:endParaRPr>
           </a:p>
         </p:txBody>
       </p:sp>
@@ -8203,13 +8118,6 @@
       <p:transition spd="slow" advClick="0" advTm="5000"/>
     </mc:Fallback>
   </mc:AlternateContent>
-  <p:timing>
-    <p:tnLst>
-      <p:par>
-        <p:cTn id="1" dur="indefinite" restart="never" nodeType="tmRoot"/>
-      </p:par>
-    </p:tnLst>
-  </p:timing>
 </p:sld>
 </file>
 
@@ -8253,11 +8161,15 @@
           <a:lstStyle/>
           <a:p>
             <a:r>
-              <a:rPr lang="bg-BG" dirty="0" smtClean="0"/>
+              <a:rPr lang="bg-BG" dirty="0"/>
               <a:t>Бутонът </a:t>
             </a:r>
             <a:r>
-              <a:rPr lang="en-US" b="1" dirty="0" smtClean="0">
+              <a:rPr lang="en-US" dirty="0"/>
+              <a:t>[</a:t>
+            </a:r>
+            <a:r>
+              <a:rPr lang="en-US" b="1" dirty="0">
                 <a:solidFill>
                   <a:schemeClr val="bg1"/>
                 </a:solidFill>
@@ -8265,19 +8177,19 @@
               <a:t>Rotate</a:t>
             </a:r>
             <a:r>
-              <a:rPr lang="en-US" dirty="0" smtClean="0"/>
-              <a:t> </a:t>
-            </a:r>
-            <a:r>
-              <a:rPr lang="bg-BG" dirty="0" smtClean="0"/>
+              <a:rPr lang="en-US" dirty="0"/>
+              <a:t>] </a:t>
+            </a:r>
+            <a:r>
+              <a:rPr lang="bg-BG" dirty="0"/>
               <a:t>се намира в </a:t>
             </a:r>
             <a:r>
-              <a:rPr lang="bg-BG" b="1" dirty="0" smtClean="0"/>
+              <a:rPr lang="bg-BG" b="1" dirty="0"/>
               <a:t>панела </a:t>
             </a:r>
             <a:r>
-              <a:rPr lang="en-US" b="1" dirty="0" smtClean="0">
+              <a:rPr lang="en-US" b="1" dirty="0">
                 <a:solidFill>
                   <a:schemeClr val="bg1"/>
                 </a:solidFill>
@@ -8285,73 +8197,73 @@
               <a:t>Image</a:t>
             </a:r>
             <a:r>
-              <a:rPr lang="bg-BG" b="1" dirty="0" smtClean="0"/>
+              <a:rPr lang="bg-BG" b="1" dirty="0"/>
               <a:t> </a:t>
             </a:r>
-            <a:endParaRPr lang="en-US" b="1" dirty="0" smtClean="0"/>
-          </a:p>
-          <a:p>
-            <a:r>
-              <a:rPr lang="bg-BG" dirty="0" smtClean="0"/>
+            <a:endParaRPr lang="en-US" b="1" dirty="0"/>
+          </a:p>
+          <a:p>
+            <a:r>
+              <a:rPr lang="bg-BG" dirty="0"/>
               <a:t>За да завъртите желаното от вас изображение, трябва да го </a:t>
             </a:r>
             <a:r>
-              <a:rPr lang="bg-BG" b="1" dirty="0" smtClean="0"/>
+              <a:rPr lang="bg-BG" b="1" dirty="0"/>
               <a:t>селектирате</a:t>
             </a:r>
           </a:p>
           <a:p>
             <a:r>
-              <a:rPr lang="en-US" dirty="0" smtClean="0"/>
+              <a:rPr lang="en-US" dirty="0"/>
               <a:t>Rotate </a:t>
             </a:r>
             <a:r>
-              <a:rPr lang="en-US" b="1" dirty="0" smtClean="0"/>
+              <a:rPr lang="en-US" b="1" dirty="0"/>
               <a:t>right 90°</a:t>
             </a:r>
-            <a:endParaRPr lang="bg-BG" b="1" dirty="0" smtClean="0"/>
-          </a:p>
-          <a:p>
-            <a:r>
-              <a:rPr lang="en-US" dirty="0" smtClean="0"/>
+            <a:endParaRPr lang="bg-BG" b="1" dirty="0"/>
+          </a:p>
+          <a:p>
+            <a:r>
+              <a:rPr lang="en-US" dirty="0"/>
               <a:t>Rotate </a:t>
             </a:r>
             <a:r>
-              <a:rPr lang="en-US" b="1" dirty="0" smtClean="0"/>
+              <a:rPr lang="en-US" b="1" dirty="0"/>
               <a:t>left 90°</a:t>
             </a:r>
             <a:r>
-              <a:rPr lang="bg-BG" b="1" dirty="0" smtClean="0"/>
+              <a:rPr lang="bg-BG" b="1" dirty="0"/>
               <a:t> </a:t>
             </a:r>
           </a:p>
           <a:p>
             <a:r>
-              <a:rPr lang="en-US" dirty="0" smtClean="0"/>
+              <a:rPr lang="en-US" dirty="0"/>
               <a:t>Rotate </a:t>
             </a:r>
             <a:r>
-              <a:rPr lang="bg-BG" b="1" dirty="0" smtClean="0"/>
+              <a:rPr lang="bg-BG" b="1" dirty="0"/>
               <a:t>18</a:t>
             </a:r>
             <a:r>
-              <a:rPr lang="en-US" b="1" dirty="0" smtClean="0"/>
+              <a:rPr lang="en-US" b="1" dirty="0"/>
               <a:t>0°</a:t>
             </a:r>
-            <a:endParaRPr lang="bg-BG" b="1" dirty="0" smtClean="0"/>
-          </a:p>
-          <a:p>
-            <a:r>
-              <a:rPr lang="en-US" b="1" dirty="0" smtClean="0"/>
+            <a:endParaRPr lang="bg-BG" b="1" dirty="0"/>
+          </a:p>
+          <a:p>
+            <a:r>
+              <a:rPr lang="en-US" b="1" dirty="0"/>
               <a:t>Flip vertical</a:t>
             </a:r>
           </a:p>
           <a:p>
             <a:r>
-              <a:rPr lang="en-US" b="1" dirty="0" smtClean="0"/>
+              <a:rPr lang="en-US" b="1" dirty="0"/>
               <a:t>Flip horizontal</a:t>
             </a:r>
-            <a:endParaRPr lang="bg-BG" dirty="0" smtClean="0"/>
+            <a:endParaRPr lang="bg-BG" dirty="0"/>
           </a:p>
           <a:p>
             <a:endParaRPr lang="en-US" dirty="0"/>
@@ -8374,7 +8286,7 @@
           <a:lstStyle/>
           <a:p>
             <a:r>
-              <a:rPr lang="bg-BG" dirty="0" smtClean="0"/>
+              <a:rPr lang="bg-BG" dirty="0"/>
               <a:t>Завъртане и обръщане на изображение</a:t>
             </a:r>
             <a:endParaRPr lang="en-US" dirty="0"/>
@@ -9995,15 +9907,15 @@
           <a:lstStyle/>
           <a:p>
             <a:r>
-              <a:rPr lang="bg-BG" dirty="0" smtClean="0"/>
+              <a:rPr lang="bg-BG" dirty="0"/>
               <a:t>Отворете </a:t>
             </a:r>
             <a:r>
-              <a:rPr lang="bg-BG" b="1" dirty="0" smtClean="0"/>
+              <a:rPr lang="bg-BG" b="1" dirty="0"/>
               <a:t>файла </a:t>
             </a:r>
             <a:r>
-              <a:rPr lang="en-US" b="1" dirty="0" smtClean="0">
+              <a:rPr lang="en-US" b="1" dirty="0">
                 <a:solidFill>
                   <a:schemeClr val="bg1"/>
                 </a:solidFill>
@@ -10011,19 +9923,19 @@
               <a:t>treasure.jpg</a:t>
             </a:r>
             <a:r>
-              <a:rPr lang="en-US" b="1" dirty="0" smtClean="0"/>
+              <a:rPr lang="en-US" b="1" dirty="0"/>
               <a:t> </a:t>
             </a:r>
             <a:r>
-              <a:rPr lang="bg-BG" dirty="0" smtClean="0"/>
+              <a:rPr lang="bg-BG" dirty="0"/>
               <a:t>в </a:t>
             </a:r>
             <a:r>
-              <a:rPr lang="bg-BG" b="1" dirty="0" smtClean="0"/>
+              <a:rPr lang="bg-BG" b="1" dirty="0"/>
               <a:t>папката </a:t>
             </a:r>
             <a:r>
-              <a:rPr lang="en-US" b="1" dirty="0" smtClean="0">
+              <a:rPr lang="en-US" b="1" dirty="0">
                 <a:solidFill>
                   <a:schemeClr val="bg1"/>
                 </a:solidFill>
@@ -10031,15 +9943,15 @@
               <a:t>Resources</a:t>
             </a:r>
             <a:r>
-              <a:rPr lang="bg-BG" dirty="0" smtClean="0"/>
+              <a:rPr lang="bg-BG" dirty="0"/>
               <a:t>. Насочете човечето в посоката с </a:t>
             </a:r>
             <a:r>
-              <a:rPr lang="bg-BG" b="1" dirty="0" smtClean="0"/>
+              <a:rPr lang="bg-BG" b="1" dirty="0"/>
               <a:t>по-голямото богатство</a:t>
             </a:r>
             <a:r>
-              <a:rPr lang="bg-BG" dirty="0" smtClean="0"/>
+              <a:rPr lang="bg-BG" dirty="0"/>
               <a:t>. Кое е то според вас?</a:t>
             </a:r>
             <a:endParaRPr lang="en-US" dirty="0"/>
@@ -10062,7 +9974,7 @@
           <a:lstStyle/>
           <a:p>
             <a:r>
-              <a:rPr lang="bg-BG" dirty="0" smtClean="0"/>
+              <a:rPr lang="bg-BG" dirty="0"/>
               <a:t>Задача: Важният избор </a:t>
             </a:r>
             <a:endParaRPr lang="en-US" dirty="0"/>
@@ -10124,13 +10036,6 @@
       <p:transition spd="slow" advClick="0" advTm="5000"/>
     </mc:Fallback>
   </mc:AlternateContent>
-  <p:timing>
-    <p:tnLst>
-      <p:par>
-        <p:cTn id="1" dur="indefinite" restart="never" nodeType="tmRoot"/>
-      </p:par>
-    </p:tnLst>
-  </p:timing>
 </p:sld>
 </file>
 
@@ -10191,11 +10096,15 @@
           <a:lstStyle/>
           <a:p>
             <a:r>
-              <a:rPr lang="bg-BG" dirty="0" smtClean="0"/>
-              <a:t>Бутонът за </a:t>
-            </a:r>
-            <a:r>
-              <a:rPr lang="en-US" b="1" dirty="0" smtClean="0">
+              <a:rPr lang="bg-BG" dirty="0"/>
+              <a:t>Бутонът </a:t>
+            </a:r>
+            <a:r>
+              <a:rPr lang="en-US" dirty="0"/>
+              <a:t>[</a:t>
+            </a:r>
+            <a:r>
+              <a:rPr lang="en-US" b="1" dirty="0">
                 <a:solidFill>
                   <a:schemeClr val="bg1"/>
                 </a:solidFill>
@@ -10203,19 +10112,19 @@
               <a:t>Resize</a:t>
             </a:r>
             <a:r>
-              <a:rPr lang="en-US" dirty="0" smtClean="0"/>
-              <a:t> </a:t>
-            </a:r>
-            <a:r>
-              <a:rPr lang="bg-BG" dirty="0" smtClean="0"/>
+              <a:rPr lang="en-US" dirty="0"/>
+              <a:t>] </a:t>
+            </a:r>
+            <a:r>
+              <a:rPr lang="bg-BG" dirty="0"/>
               <a:t>се намира в </a:t>
             </a:r>
             <a:r>
-              <a:rPr lang="bg-BG" b="1" dirty="0" smtClean="0"/>
+              <a:rPr lang="bg-BG" b="1" dirty="0"/>
               <a:t>панела </a:t>
             </a:r>
             <a:r>
-              <a:rPr lang="en-US" b="1" dirty="0" smtClean="0">
+              <a:rPr lang="en-US" b="1" dirty="0">
                 <a:solidFill>
                   <a:schemeClr val="bg1"/>
                 </a:solidFill>
@@ -10229,12 +10138,12 @@
               <a:t>За да </a:t>
             </a:r>
             <a:r>
-              <a:rPr lang="bg-BG" dirty="0" smtClean="0"/>
-              <a:t>наклоните </a:t>
+              <a:rPr lang="bg-BG" b="1" dirty="0"/>
+              <a:t>наклоните</a:t>
             </a:r>
             <a:r>
               <a:rPr lang="bg-BG" dirty="0"/>
-              <a:t>желаното от вас изображение, трябва да го </a:t>
+              <a:t> желаното от вас изображение, трябва да го </a:t>
             </a:r>
             <a:r>
               <a:rPr lang="bg-BG" b="1" dirty="0"/>
@@ -10262,7 +10171,7 @@
           <a:lstStyle/>
           <a:p>
             <a:r>
-              <a:rPr lang="bg-BG" dirty="0" smtClean="0"/>
+              <a:rPr lang="bg-BG" dirty="0"/>
               <a:t>Наклоняване на изображение</a:t>
             </a:r>
             <a:endParaRPr lang="en-US" dirty="0"/>
@@ -10432,7 +10341,7 @@
           <a:p>
             <a:pPr algn="ctr"/>
             <a:r>
-              <a:rPr lang="bg-BG" sz="2800" b="1" dirty="0" smtClean="0">
+              <a:rPr lang="bg-BG" sz="2800" b="1" dirty="0">
                 <a:solidFill>
                   <a:srgbClr val="FFFFFF"/>
                 </a:solidFill>
@@ -10447,7 +10356,7 @@
               <a:t>В полетата </a:t>
             </a:r>
             <a:r>
-              <a:rPr lang="en-US" sz="2800" b="1" dirty="0" smtClean="0">
+              <a:rPr lang="en-US" sz="2800" b="1" dirty="0">
                 <a:solidFill>
                   <a:schemeClr val="accent1">
                     <a:lumMod val="60000"/>
@@ -10465,7 +10374,7 @@
               <a:t>Horizontal</a:t>
             </a:r>
             <a:r>
-              <a:rPr lang="bg-BG" sz="2800" b="1" dirty="0" smtClean="0">
+              <a:rPr lang="bg-BG" sz="2800" b="1" dirty="0">
                 <a:solidFill>
                   <a:srgbClr val="FFFFFF"/>
                 </a:solidFill>
@@ -10480,7 +10389,7 @@
               <a:t> и </a:t>
             </a:r>
             <a:r>
-              <a:rPr lang="en-US" sz="2800" b="1" dirty="0" smtClean="0">
+              <a:rPr lang="en-US" sz="2800" b="1" dirty="0">
                 <a:solidFill>
                   <a:schemeClr val="accent1">
                     <a:lumMod val="60000"/>
@@ -10498,7 +10407,7 @@
               <a:t>Vertical</a:t>
             </a:r>
             <a:r>
-              <a:rPr lang="en-US" sz="2800" b="1" dirty="0" smtClean="0">
+              <a:rPr lang="en-US" sz="2800" b="1" dirty="0">
                 <a:solidFill>
                   <a:srgbClr val="FFFFFF"/>
                 </a:solidFill>
@@ -10513,7 +10422,7 @@
               <a:t> </a:t>
             </a:r>
             <a:r>
-              <a:rPr lang="bg-BG" sz="2800" b="1" dirty="0" smtClean="0">
+              <a:rPr lang="bg-BG" sz="2800" b="1" dirty="0">
                 <a:solidFill>
                   <a:srgbClr val="FFFFFF"/>
                 </a:solidFill>
@@ -10531,7 +10440,7 @@
           <a:p>
             <a:pPr algn="ctr"/>
             <a:r>
-              <a:rPr lang="bg-BG" sz="2800" b="1" dirty="0" smtClean="0">
+              <a:rPr lang="bg-BG" sz="2800" b="1" dirty="0">
                 <a:solidFill>
                   <a:srgbClr val="FFFFFF"/>
                 </a:solidFill>
@@ -10911,13 +10820,6 @@
       <p:transition spd="slow" advClick="0" advTm="5000"/>
     </mc:Fallback>
   </mc:AlternateContent>
-  <p:timing>
-    <p:tnLst>
-      <p:par>
-        <p:cTn id="1" dur="indefinite" restart="never" nodeType="tmRoot"/>
-      </p:par>
-    </p:tnLst>
-  </p:timing>
 </p:sld>
 </file>
 
@@ -10978,11 +10880,15 @@
           <a:lstStyle/>
           <a:p>
             <a:r>
-              <a:rPr lang="bg-BG" dirty="0" smtClean="0"/>
+              <a:rPr lang="bg-BG" dirty="0"/>
               <a:t>Бутонът </a:t>
             </a:r>
             <a:r>
-              <a:rPr lang="en-US" b="1" dirty="0" smtClean="0">
+              <a:rPr lang="en-US" dirty="0"/>
+              <a:t>[</a:t>
+            </a:r>
+            <a:r>
+              <a:rPr lang="en-US" b="1" dirty="0">
                 <a:solidFill>
                   <a:schemeClr val="bg1"/>
                 </a:solidFill>
@@ -10990,19 +10896,19 @@
               <a:t>Crop</a:t>
             </a:r>
             <a:r>
-              <a:rPr lang="en-US" dirty="0" smtClean="0"/>
-              <a:t> </a:t>
-            </a:r>
-            <a:r>
-              <a:rPr lang="bg-BG" dirty="0" smtClean="0"/>
+              <a:rPr lang="en-US" dirty="0"/>
+              <a:t>] </a:t>
+            </a:r>
+            <a:r>
+              <a:rPr lang="bg-BG" dirty="0"/>
               <a:t>се намира в </a:t>
             </a:r>
             <a:r>
-              <a:rPr lang="bg-BG" b="1" dirty="0" smtClean="0"/>
+              <a:rPr lang="bg-BG" b="1" dirty="0"/>
               <a:t>панела </a:t>
             </a:r>
             <a:r>
-              <a:rPr lang="en-US" b="1" dirty="0" smtClean="0">
+              <a:rPr lang="en-US" b="1" dirty="0">
                 <a:solidFill>
                   <a:schemeClr val="bg1"/>
                 </a:solidFill>
@@ -11012,38 +10918,41 @@
           </a:p>
           <a:p>
             <a:r>
-              <a:rPr lang="bg-BG" dirty="0" smtClean="0"/>
+              <a:rPr lang="bg-BG" dirty="0"/>
               <a:t>След като сте </a:t>
             </a:r>
             <a:r>
-              <a:rPr lang="bg-BG" b="1" dirty="0" smtClean="0"/>
+              <a:rPr lang="bg-BG" b="1" dirty="0"/>
               <a:t>селектирали</a:t>
             </a:r>
             <a:r>
-              <a:rPr lang="bg-BG" dirty="0" smtClean="0"/>
+              <a:rPr lang="bg-BG" dirty="0"/>
               <a:t> желанат част от вас част, която </a:t>
             </a:r>
             <a:r>
-              <a:rPr lang="bg-BG" b="1" dirty="0" smtClean="0"/>
+              <a:rPr lang="bg-BG" b="1" dirty="0"/>
               <a:t>искате да остане</a:t>
             </a:r>
             <a:r>
-              <a:rPr lang="bg-BG" dirty="0" smtClean="0"/>
-              <a:t>, натискате </a:t>
-            </a:r>
-            <a:r>
-              <a:rPr lang="en-US" b="1" dirty="0" smtClean="0">
+              <a:rPr lang="bg-BG" dirty="0"/>
+              <a:t>, натискате</a:t>
+            </a:r>
+            <a:r>
+              <a:rPr lang="en-US" dirty="0"/>
+              <a:t> [</a:t>
+            </a:r>
+            <a:r>
+              <a:rPr lang="en-US" b="1" dirty="0">
                 <a:solidFill>
                   <a:schemeClr val="bg1"/>
                 </a:solidFill>
               </a:rPr>
               <a:t>Crop</a:t>
             </a:r>
-            <a:endParaRPr lang="en-US" b="1" dirty="0">
-              <a:solidFill>
-                <a:schemeClr val="bg1"/>
-              </a:solidFill>
-            </a:endParaRPr>
+            <a:r>
+              <a:rPr lang="en-US" dirty="0"/>
+              <a:t>]</a:t>
+            </a:r>
           </a:p>
         </p:txBody>
       </p:sp>
@@ -11063,7 +10972,7 @@
           <a:lstStyle/>
           <a:p>
             <a:r>
-              <a:rPr lang="bg-BG" dirty="0" smtClean="0"/>
+              <a:rPr lang="bg-BG" dirty="0"/>
               <a:t>Изрязване на изображение</a:t>
             </a:r>
             <a:endParaRPr lang="en-US" dirty="0"/>
@@ -11078,7 +10987,7 @@
           </p:cNvPicPr>
           <p:nvPr/>
         </p:nvPicPr>
-        <p:blipFill>
+        <p:blipFill rotWithShape="1">
           <a:blip r:embed="rId2">
             <a:extLst>
               <a:ext uri="{28A0092B-C50C-407E-A947-70E740481C1C}">
@@ -11086,14 +10995,13 @@
               </a:ext>
             </a:extLst>
           </a:blip>
-          <a:stretch>
-            <a:fillRect/>
-          </a:stretch>
+          <a:srcRect l="-1" r="17607"/>
+          <a:stretch/>
         </p:blipFill>
         <p:spPr>
           <a:xfrm>
-            <a:off x="2901000" y="3159000"/>
-            <a:ext cx="6390000" cy="3455630"/>
+            <a:off x="3351000" y="3153944"/>
+            <a:ext cx="5490000" cy="3603306"/>
           </a:xfrm>
           <a:prstGeom prst="rect">
             <a:avLst/>
@@ -11309,15 +11217,15 @@
           <a:lstStyle/>
           <a:p>
             <a:r>
-              <a:rPr lang="bg-BG" dirty="0" smtClean="0"/>
+              <a:rPr lang="bg-BG" dirty="0"/>
               <a:t>Отворете </a:t>
             </a:r>
             <a:r>
-              <a:rPr lang="bg-BG" b="1" dirty="0" smtClean="0"/>
+              <a:rPr lang="bg-BG" b="1" dirty="0"/>
               <a:t>файла </a:t>
             </a:r>
             <a:r>
-              <a:rPr lang="en-US" b="1" dirty="0" smtClean="0">
+              <a:rPr lang="en-US" b="1" dirty="0">
                 <a:solidFill>
                   <a:schemeClr val="bg1"/>
                 </a:solidFill>
@@ -11325,19 +11233,19 @@
               <a:t>hair.png</a:t>
             </a:r>
             <a:r>
-              <a:rPr lang="en-US" b="1" dirty="0" smtClean="0"/>
+              <a:rPr lang="en-US" b="1" dirty="0"/>
               <a:t> </a:t>
             </a:r>
             <a:r>
-              <a:rPr lang="bg-BG" dirty="0" smtClean="0"/>
+              <a:rPr lang="bg-BG" dirty="0"/>
               <a:t>в </a:t>
             </a:r>
             <a:r>
-              <a:rPr lang="bg-BG" b="1" dirty="0" smtClean="0"/>
+              <a:rPr lang="bg-BG" b="1" dirty="0"/>
               <a:t>папката </a:t>
             </a:r>
             <a:r>
-              <a:rPr lang="en-US" b="1" dirty="0" smtClean="0">
+              <a:rPr lang="en-US" b="1" dirty="0">
                 <a:solidFill>
                   <a:schemeClr val="bg1"/>
                 </a:solidFill>
@@ -11345,19 +11253,19 @@
               <a:t>Resources</a:t>
             </a:r>
             <a:r>
-              <a:rPr lang="en-US" dirty="0" smtClean="0"/>
+              <a:rPr lang="en-US" dirty="0"/>
               <a:t>. </a:t>
             </a:r>
             <a:r>
-              <a:rPr lang="bg-BG" dirty="0" smtClean="0"/>
+              <a:rPr lang="bg-BG" dirty="0"/>
               <a:t>Отрежете човечето, така че да остане </a:t>
             </a:r>
             <a:r>
-              <a:rPr lang="bg-BG" b="1" dirty="0" smtClean="0"/>
+              <a:rPr lang="bg-BG" b="1" dirty="0"/>
               <a:t>без коса</a:t>
             </a:r>
             <a:r>
-              <a:rPr lang="bg-BG" dirty="0" smtClean="0"/>
+              <a:rPr lang="bg-BG" dirty="0"/>
               <a:t>.</a:t>
             </a:r>
             <a:endParaRPr lang="en-US" dirty="0"/>
@@ -11380,7 +11288,7 @@
           <a:lstStyle/>
           <a:p>
             <a:r>
-              <a:rPr lang="bg-BG" dirty="0" smtClean="0"/>
+              <a:rPr lang="bg-BG" dirty="0"/>
               <a:t>Задача: Без коса</a:t>
             </a:r>
             <a:endParaRPr lang="en-US" dirty="0"/>
@@ -11435,13 +11343,6 @@
       <p:transition spd="slow" advClick="0" advTm="5000"/>
     </mc:Fallback>
   </mc:AlternateContent>
-  <p:timing>
-    <p:tnLst>
-      <p:par>
-        <p:cTn id="1" dur="indefinite" restart="never" nodeType="tmRoot"/>
-      </p:par>
-    </p:tnLst>
-  </p:timing>
 </p:sld>
 </file>
 
@@ -11484,11 +11385,7 @@
           <a:p>
             <a:r>
               <a:rPr lang="bg-BG" dirty="0"/>
-              <a:t>͏Отпечатване на </a:t>
-            </a:r>
-            <a:r>
-              <a:rPr lang="bg-BG" dirty="0" smtClean="0"/>
-              <a:t>изображение</a:t>
+              <a:t>͏Отпечатване на изображение</a:t>
             </a:r>
             <a:endParaRPr lang="en-US" dirty="0"/>
           </a:p>
@@ -11574,13 +11471,6 @@
       <p:transition spd="slow" advClick="0" advTm="5000"/>
     </mc:Fallback>
   </mc:AlternateContent>
-  <p:timing>
-    <p:tnLst>
-      <p:par>
-        <p:cTn id="1" dur="indefinite" restart="never" nodeType="tmRoot"/>
-      </p:par>
-    </p:tnLst>
-  </p:timing>
 </p:sld>
 </file>
 
@@ -11620,11 +11510,7 @@
           <a:p>
             <a:r>
               <a:rPr lang="bg-BG" dirty="0"/>
-              <a:t>͏Отпечатване на </a:t>
-            </a:r>
-            <a:r>
-              <a:rPr lang="bg-BG" dirty="0" smtClean="0"/>
-              <a:t>изображение</a:t>
+              <a:t>͏Отпечатване на изображение</a:t>
             </a:r>
             <a:endParaRPr lang="en-US" dirty="0"/>
           </a:p>
@@ -11720,7 +11606,7 @@
           <a:p>
             <a:pPr algn="ctr"/>
             <a:r>
-              <a:rPr lang="bg-BG" sz="2800" b="1" dirty="0" smtClean="0">
+              <a:rPr lang="bg-BG" sz="2800" b="1" dirty="0">
                 <a:solidFill>
                   <a:srgbClr val="FFFFFF"/>
                 </a:solidFill>
@@ -11735,7 +11621,7 @@
               <a:t>Отваряме менюто </a:t>
             </a:r>
             <a:r>
-              <a:rPr lang="en-US" sz="2800" b="1" dirty="0" smtClean="0">
+              <a:rPr lang="en-US" sz="2800" b="1" dirty="0">
                 <a:solidFill>
                   <a:schemeClr val="accent1">
                     <a:lumMod val="60000"/>
@@ -11752,21 +11638,6 @@
               </a:rPr>
               <a:t>File</a:t>
             </a:r>
-            <a:endParaRPr lang="en-US" sz="2800" b="1" dirty="0">
-              <a:solidFill>
-                <a:schemeClr val="accent1">
-                  <a:lumMod val="60000"/>
-                  <a:lumOff val="40000"/>
-                </a:schemeClr>
-              </a:solidFill>
-              <a:effectLst>
-                <a:outerShdw blurRad="38100" dist="38100" dir="2700000" algn="tl">
-                  <a:srgbClr val="000000">
-                    <a:alpha val="43137"/>
-                  </a:srgbClr>
-                </a:outerShdw>
-              </a:effectLst>
-            </a:endParaRPr>
           </a:p>
         </p:txBody>
       </p:sp>
@@ -11905,11 +11776,7 @@
           <a:p>
             <a:r>
               <a:rPr lang="bg-BG" dirty="0"/>
-              <a:t>͏Отпечатване на </a:t>
-            </a:r>
-            <a:r>
-              <a:rPr lang="bg-BG" dirty="0" smtClean="0"/>
-              <a:t>изображение</a:t>
+              <a:t>͏Отпечатване на изображение</a:t>
             </a:r>
             <a:endParaRPr lang="en-US" dirty="0"/>
           </a:p>
@@ -12005,7 +11872,7 @@
           <a:p>
             <a:pPr algn="ctr"/>
             <a:r>
-              <a:rPr lang="bg-BG" sz="2800" b="1" dirty="0" smtClean="0">
+              <a:rPr lang="bg-BG" sz="2800" b="1" dirty="0">
                 <a:solidFill>
                   <a:srgbClr val="FFFFFF"/>
                 </a:solidFill>
@@ -12020,7 +11887,7 @@
               <a:t>Избираме командата </a:t>
             </a:r>
             <a:r>
-              <a:rPr lang="en-US" sz="2800" b="1" dirty="0" smtClean="0">
+              <a:rPr lang="en-US" sz="2800" b="1" dirty="0">
                 <a:solidFill>
                   <a:schemeClr val="accent1">
                     <a:lumMod val="60000"/>
@@ -12037,21 +11904,6 @@
               </a:rPr>
               <a:t>Print</a:t>
             </a:r>
-            <a:endParaRPr lang="en-US" sz="2800" b="1" dirty="0">
-              <a:solidFill>
-                <a:schemeClr val="accent1">
-                  <a:lumMod val="60000"/>
-                  <a:lumOff val="40000"/>
-                </a:schemeClr>
-              </a:solidFill>
-              <a:effectLst>
-                <a:outerShdw blurRad="38100" dist="38100" dir="2700000" algn="tl">
-                  <a:srgbClr val="000000">
-                    <a:alpha val="43137"/>
-                  </a:srgbClr>
-                </a:outerShdw>
-              </a:effectLst>
-            </a:endParaRPr>
           </a:p>
         </p:txBody>
       </p:sp>
@@ -12322,72 +12174,80 @@
           <a:lstStyle/>
           <a:p>
             <a:r>
-              <a:rPr lang="bg-BG" dirty="0" smtClean="0"/>
+              <a:rPr lang="bg-BG" dirty="0"/>
               <a:t>͏͏</a:t>
             </a:r>
             <a:r>
-              <a:rPr lang="bg-BG" b="1" dirty="0" smtClean="0"/>
+              <a:rPr lang="bg-BG" b="1" dirty="0"/>
               <a:t>Въвеждане на текст</a:t>
             </a:r>
           </a:p>
           <a:p>
             <a:r>
-              <a:rPr lang="bg-BG" dirty="0" smtClean="0"/>
-              <a:t>Пробразуване на графично изображение</a:t>
+              <a:rPr lang="bg-BG" dirty="0"/>
+              <a:t>͏</a:t>
+            </a:r>
+            <a:r>
+              <a:rPr lang="bg-BG" b="1" dirty="0"/>
+              <a:t>Преобразуване</a:t>
+            </a:r>
+            <a:r>
+              <a:rPr lang="bg-BG" dirty="0"/>
+              <a:t> на графично изображение:</a:t>
             </a:r>
           </a:p>
           <a:p>
             <a:pPr lvl="1"/>
             <a:r>
-              <a:rPr lang="bg-BG" b="1" dirty="0" smtClean="0"/>
+              <a:rPr lang="bg-BG" b="1" dirty="0"/>
               <a:t>Завъртане</a:t>
             </a:r>
             <a:r>
-              <a:rPr lang="bg-BG" dirty="0" smtClean="0"/>
+              <a:rPr lang="bg-BG" dirty="0"/>
               <a:t> и </a:t>
             </a:r>
             <a:r>
-              <a:rPr lang="bg-BG" b="1" dirty="0" smtClean="0"/>
+              <a:rPr lang="bg-BG" b="1" dirty="0"/>
               <a:t>обръщане</a:t>
             </a:r>
             <a:r>
-              <a:rPr lang="bg-BG" dirty="0" smtClean="0"/>
+              <a:rPr lang="bg-BG" dirty="0"/>
               <a:t> на изображение</a:t>
             </a:r>
           </a:p>
           <a:p>
             <a:pPr lvl="1"/>
             <a:r>
-              <a:rPr lang="bg-BG" b="1" dirty="0" smtClean="0"/>
+              <a:rPr lang="bg-BG" b="1" dirty="0"/>
               <a:t>Наклоняване</a:t>
             </a:r>
             <a:r>
-              <a:rPr lang="bg-BG" dirty="0" smtClean="0"/>
+              <a:rPr lang="bg-BG" dirty="0"/>
               <a:t> на изображение</a:t>
             </a:r>
           </a:p>
           <a:p>
             <a:pPr lvl="1"/>
             <a:r>
-              <a:rPr lang="bg-BG" b="1" dirty="0" smtClean="0"/>
+              <a:rPr lang="bg-BG" b="1" dirty="0"/>
               <a:t>Изрязване</a:t>
             </a:r>
             <a:r>
-              <a:rPr lang="bg-BG" dirty="0" smtClean="0"/>
+              <a:rPr lang="bg-BG" dirty="0"/>
               <a:t> на изображение</a:t>
             </a:r>
           </a:p>
           <a:p>
             <a:r>
-              <a:rPr lang="bg-BG" dirty="0" smtClean="0"/>
+              <a:rPr lang="bg-BG" dirty="0"/>
               <a:t>͏</a:t>
             </a:r>
             <a:r>
-              <a:rPr lang="bg-BG" b="1" dirty="0" smtClean="0"/>
+              <a:rPr lang="bg-BG" b="1" dirty="0"/>
               <a:t>Отпечатване</a:t>
             </a:r>
             <a:r>
-              <a:rPr lang="bg-BG" dirty="0" smtClean="0"/>
+              <a:rPr lang="bg-BG" dirty="0"/>
               <a:t> на изображение</a:t>
             </a:r>
           </a:p>
@@ -12802,11 +12662,7 @@
           <a:p>
             <a:r>
               <a:rPr lang="bg-BG" dirty="0"/>
-              <a:t>͏Отпечатване на </a:t>
-            </a:r>
-            <a:r>
-              <a:rPr lang="bg-BG" dirty="0" smtClean="0"/>
-              <a:t>изображение</a:t>
+              <a:t>͏Отпечатване на изображение</a:t>
             </a:r>
             <a:endParaRPr lang="en-US" dirty="0"/>
           </a:p>
@@ -12902,7 +12758,7 @@
           <a:p>
             <a:pPr algn="ctr"/>
             <a:r>
-              <a:rPr lang="bg-BG" sz="2800" b="1" dirty="0" smtClean="0">
+              <a:rPr lang="bg-BG" sz="2800" b="1" dirty="0">
                 <a:solidFill>
                   <a:srgbClr val="FFFFFF"/>
                 </a:solidFill>
@@ -13164,7 +13020,7 @@
           <a:p>
             <a:pPr algn="ctr"/>
             <a:r>
-              <a:rPr lang="bg-BG" sz="2800" b="1" dirty="0" smtClean="0">
+              <a:rPr lang="bg-BG" sz="2800" b="1" dirty="0">
                 <a:solidFill>
                   <a:srgbClr val="FFFFFF"/>
                 </a:solidFill>
@@ -13564,7 +13420,7 @@
           <a:p>
             <a:pPr algn="ctr"/>
             <a:r>
-              <a:rPr lang="bg-BG" sz="2800" b="1" dirty="0" smtClean="0">
+              <a:rPr lang="bg-BG" sz="2800" b="1" dirty="0">
                 <a:solidFill>
                   <a:srgbClr val="FFFFFF"/>
                 </a:solidFill>
@@ -13719,7 +13575,7 @@
           <a:p>
             <a:pPr algn="ctr"/>
             <a:r>
-              <a:rPr lang="bg-BG" sz="2800" b="1" dirty="0" smtClean="0">
+              <a:rPr lang="bg-BG" sz="2800" b="1" dirty="0">
                 <a:solidFill>
                   <a:srgbClr val="FFFFFF"/>
                 </a:solidFill>
@@ -13874,7 +13730,7 @@
           <a:p>
             <a:pPr algn="ctr"/>
             <a:r>
-              <a:rPr lang="bg-BG" sz="2800" b="1" dirty="0" smtClean="0">
+              <a:rPr lang="bg-BG" sz="2800" b="1" dirty="0">
                 <a:solidFill>
                   <a:srgbClr val="FFFFFF"/>
                 </a:solidFill>
@@ -14334,7 +14190,7 @@
           <a:lstStyle/>
           <a:p>
             <a:r>
-              <a:rPr lang="bg-BG" dirty="0" smtClean="0"/>
+              <a:rPr lang="bg-BG" dirty="0"/>
               <a:t>Отваря се диалогов прозорец, откъдето се избира:</a:t>
             </a:r>
           </a:p>
@@ -14345,11 +14201,11 @@
               </a:spcAft>
             </a:pPr>
             <a:r>
-              <a:rPr lang="bg-BG" b="1" dirty="0" smtClean="0"/>
+              <a:rPr lang="bg-BG" b="1" dirty="0"/>
               <a:t>Принтерът</a:t>
             </a:r>
             <a:r>
-              <a:rPr lang="bg-BG" dirty="0" smtClean="0"/>
+              <a:rPr lang="bg-BG" dirty="0"/>
               <a:t>, който ще отпечатва изображението</a:t>
             </a:r>
           </a:p>
@@ -14360,11 +14216,11 @@
               </a:spcAft>
             </a:pPr>
             <a:r>
-              <a:rPr lang="bg-BG" b="1" dirty="0" smtClean="0"/>
+              <a:rPr lang="bg-BG" b="1" dirty="0"/>
               <a:t>Кои страници </a:t>
             </a:r>
             <a:r>
-              <a:rPr lang="bg-BG" dirty="0" smtClean="0"/>
+              <a:rPr lang="bg-BG" dirty="0"/>
               <a:t>да се отпечатат</a:t>
             </a:r>
           </a:p>
@@ -14375,11 +14231,11 @@
               </a:spcAft>
             </a:pPr>
             <a:r>
-              <a:rPr lang="bg-BG" b="1" dirty="0" smtClean="0"/>
+              <a:rPr lang="bg-BG" b="1" dirty="0"/>
               <a:t>Колко копия </a:t>
             </a:r>
             <a:r>
-              <a:rPr lang="bg-BG" dirty="0" smtClean="0"/>
+              <a:rPr lang="bg-BG" dirty="0"/>
               <a:t>да се отпечатат</a:t>
             </a:r>
           </a:p>
@@ -14390,11 +14246,11 @@
               </a:spcAft>
             </a:pPr>
             <a:r>
-              <a:rPr lang="bg-BG" b="1" dirty="0" smtClean="0"/>
+              <a:rPr lang="bg-BG" b="1" dirty="0"/>
               <a:t>Как да се подредят </a:t>
             </a:r>
             <a:r>
-              <a:rPr lang="bg-BG" dirty="0" smtClean="0"/>
+              <a:rPr lang="bg-BG" dirty="0"/>
               <a:t>страниците</a:t>
             </a:r>
             <a:endParaRPr lang="en-US" dirty="0"/>
@@ -14417,10 +14273,9 @@
           <a:lstStyle/>
           <a:p>
             <a:r>
-              <a:rPr lang="en-US" dirty="0" smtClean="0"/>
+              <a:rPr lang="en-US" dirty="0"/>
               <a:t>Print</a:t>
             </a:r>
-            <a:endParaRPr lang="en-US" dirty="0"/>
           </a:p>
         </p:txBody>
       </p:sp>
@@ -15373,7 +15228,7 @@
               </a:buClr>
             </a:pPr>
             <a:r>
-              <a:rPr lang="bg-BG" sz="3200" dirty="0" smtClean="0">
+              <a:rPr lang="bg-BG" sz="3200" dirty="0">
                 <a:solidFill>
                   <a:schemeClr val="bg2"/>
                 </a:solidFill>
@@ -15381,7 +15236,7 @@
               <a:t>͏</a:t>
             </a:r>
             <a:r>
-              <a:rPr lang="bg-BG" sz="3200" b="1" dirty="0" smtClean="0">
+              <a:rPr lang="bg-BG" sz="3200" b="1" dirty="0">
                 <a:solidFill>
                   <a:schemeClr val="accent1">
                     <a:lumMod val="60000"/>
@@ -15392,7 +15247,7 @@
               <a:t>Въвеждане</a:t>
             </a:r>
             <a:r>
-              <a:rPr lang="bg-BG" sz="3200" b="1" dirty="0" smtClean="0">
+              <a:rPr lang="bg-BG" sz="3200" b="1" dirty="0">
                 <a:solidFill>
                   <a:schemeClr val="bg2"/>
                 </a:solidFill>
@@ -15400,7 +15255,7 @@
               <a:t> на текст </a:t>
             </a:r>
             <a:r>
-              <a:rPr lang="bg-BG" sz="3200" dirty="0" smtClean="0">
+              <a:rPr lang="bg-BG" sz="3200" dirty="0">
                 <a:solidFill>
                   <a:schemeClr val="bg2"/>
                 </a:solidFill>
@@ -15415,7 +15270,7 @@
               </a:buClr>
             </a:pPr>
             <a:r>
-              <a:rPr lang="bg-BG" sz="3200" dirty="0" smtClean="0">
+              <a:rPr lang="bg-BG" sz="3200" dirty="0">
                 <a:solidFill>
                   <a:schemeClr val="bg2"/>
                 </a:solidFill>
@@ -15430,7 +15285,7 @@
               </a:buClr>
             </a:pPr>
             <a:r>
-              <a:rPr lang="ru-RU" sz="3000" dirty="0" smtClean="0">
+              <a:rPr lang="ru-RU" sz="3000" dirty="0">
                 <a:solidFill>
                   <a:schemeClr val="bg2"/>
                 </a:solidFill>
@@ -15438,7 +15293,7 @@
               <a:t>͏</a:t>
             </a:r>
             <a:r>
-              <a:rPr lang="ru-RU" sz="3000" b="1" dirty="0" smtClean="0">
+              <a:rPr lang="ru-RU" sz="3000" b="1" dirty="0">
                 <a:solidFill>
                   <a:schemeClr val="bg2"/>
                 </a:solidFill>
@@ -15446,7 +15301,7 @@
               <a:t>Шрифт</a:t>
             </a:r>
             <a:r>
-              <a:rPr lang="ru-RU" sz="3000" dirty="0" smtClean="0">
+              <a:rPr lang="ru-RU" sz="3000" dirty="0">
                 <a:solidFill>
                   <a:schemeClr val="bg2"/>
                 </a:solidFill>
@@ -15454,7 +15309,7 @@
               <a:t>, </a:t>
             </a:r>
             <a:r>
-              <a:rPr lang="ru-RU" sz="3000" b="1" dirty="0" smtClean="0">
+              <a:rPr lang="ru-RU" sz="3000" b="1" dirty="0">
                 <a:solidFill>
                   <a:schemeClr val="bg2"/>
                 </a:solidFill>
@@ -15462,7 +15317,7 @@
               <a:t>цвят</a:t>
             </a:r>
             <a:r>
-              <a:rPr lang="ru-RU" sz="3000" dirty="0" smtClean="0">
+              <a:rPr lang="ru-RU" sz="3000" dirty="0">
                 <a:solidFill>
                   <a:schemeClr val="bg2"/>
                 </a:solidFill>
@@ -15470,7 +15325,7 @@
               <a:t>, </a:t>
             </a:r>
             <a:r>
-              <a:rPr lang="ru-RU" sz="3000" b="1" dirty="0" smtClean="0">
+              <a:rPr lang="ru-RU" sz="3000" b="1" dirty="0">
                 <a:solidFill>
                   <a:schemeClr val="bg2"/>
                 </a:solidFill>
@@ -15488,7 +15343,7 @@
               </a:buClr>
             </a:pPr>
             <a:r>
-              <a:rPr lang="ru-RU" sz="3200" b="1" dirty="0" smtClean="0">
+              <a:rPr lang="ru-RU" sz="3200" b="1" dirty="0">
                 <a:solidFill>
                   <a:schemeClr val="accent1">
                     <a:lumMod val="60000"/>
@@ -15499,7 +15354,7 @@
               <a:t>Преобразуване</a:t>
             </a:r>
             <a:r>
-              <a:rPr lang="ru-RU" sz="3200" dirty="0" smtClean="0">
+              <a:rPr lang="ru-RU" sz="3200" dirty="0">
                 <a:solidFill>
                   <a:schemeClr val="bg2"/>
                 </a:solidFill>
@@ -15514,7 +15369,7 @@
               </a:buClr>
             </a:pPr>
             <a:r>
-              <a:rPr lang="ru-RU" sz="3000" b="1" dirty="0" smtClean="0">
+              <a:rPr lang="ru-RU" sz="3000" b="1" dirty="0">
                 <a:solidFill>
                   <a:schemeClr val="bg2"/>
                 </a:solidFill>
@@ -15522,7 +15377,7 @@
               <a:t>Завъртане</a:t>
             </a:r>
             <a:r>
-              <a:rPr lang="ru-RU" sz="3000" dirty="0" smtClean="0">
+              <a:rPr lang="ru-RU" sz="3000" dirty="0">
                 <a:solidFill>
                   <a:schemeClr val="bg2"/>
                 </a:solidFill>
@@ -15530,7 +15385,7 @@
               <a:t> и </a:t>
             </a:r>
             <a:r>
-              <a:rPr lang="ru-RU" sz="3000" b="1" dirty="0" smtClean="0">
+              <a:rPr lang="ru-RU" sz="3000" b="1" dirty="0">
                 <a:solidFill>
                   <a:schemeClr val="bg2"/>
                 </a:solidFill>
@@ -15545,7 +15400,7 @@
               </a:buClr>
             </a:pPr>
             <a:r>
-              <a:rPr lang="ru-RU" sz="3000" b="1" dirty="0" smtClean="0">
+              <a:rPr lang="ru-RU" sz="3000" b="1" dirty="0">
                 <a:solidFill>
                   <a:schemeClr val="bg2"/>
                 </a:solidFill>
@@ -15560,7 +15415,7 @@
               </a:buClr>
             </a:pPr>
             <a:r>
-              <a:rPr lang="ru-RU" sz="3000" b="1" dirty="0" smtClean="0">
+              <a:rPr lang="ru-RU" sz="3000" b="1" dirty="0">
                 <a:solidFill>
                   <a:schemeClr val="bg2"/>
                 </a:solidFill>
@@ -15575,7 +15430,7 @@
               </a:buClr>
             </a:pPr>
             <a:r>
-              <a:rPr lang="ru-RU" sz="3200" b="1" dirty="0" smtClean="0">
+              <a:rPr lang="ru-RU" sz="3200" b="1" dirty="0">
                 <a:solidFill>
                   <a:schemeClr val="accent1">
                     <a:lumMod val="60000"/>
@@ -15586,18 +15441,13 @@
               <a:t>Отпечатване</a:t>
             </a:r>
             <a:r>
-              <a:rPr lang="ru-RU" sz="3200" dirty="0" smtClean="0">
+              <a:rPr lang="ru-RU" sz="3200" dirty="0">
                 <a:solidFill>
                   <a:schemeClr val="bg2"/>
                 </a:solidFill>
               </a:rPr>
               <a:t> на изображение</a:t>
             </a:r>
-            <a:endParaRPr lang="ru-RU" sz="3200" dirty="0">
-              <a:solidFill>
-                <a:schemeClr val="bg2"/>
-              </a:solidFill>
-            </a:endParaRPr>
           </a:p>
           <a:p>
             <a:pPr marL="381049">
@@ -15608,7 +15458,7 @@
                 <a:schemeClr val="bg2"/>
               </a:buClr>
             </a:pPr>
-            <a:endParaRPr lang="bg-BG" sz="2800" dirty="0" smtClean="0">
+            <a:endParaRPr lang="bg-BG" sz="2800" dirty="0">
               <a:solidFill>
                 <a:schemeClr val="bg2"/>
               </a:solidFill>
@@ -15685,7 +15535,7 @@
                                         <p:tgtEl>
                                           <p:spTgt spid="15">
                                             <p:txEl>
-                                              <p:pRg st="0" end="0"/>
+                                              <p:pRg st="1" end="1"/>
                                             </p:txEl>
                                           </p:spTgt>
                                         </p:tgtEl>
@@ -15734,7 +15584,7 @@
                                         <p:tgtEl>
                                           <p:spTgt spid="15">
                                             <p:txEl>
-                                              <p:pRg st="1" end="1"/>
+                                              <p:pRg st="2" end="2"/>
                                             </p:txEl>
                                           </p:spTgt>
                                         </p:tgtEl>
@@ -15783,7 +15633,7 @@
                                         <p:tgtEl>
                                           <p:spTgt spid="15">
                                             <p:txEl>
-                                              <p:pRg st="2" end="2"/>
+                                              <p:pRg st="3" end="3"/>
                                             </p:txEl>
                                           </p:spTgt>
                                         </p:tgtEl>
@@ -15832,7 +15682,7 @@
                                         <p:tgtEl>
                                           <p:spTgt spid="15">
                                             <p:txEl>
-                                              <p:pRg st="3" end="3"/>
+                                              <p:pRg st="4" end="4"/>
                                             </p:txEl>
                                           </p:spTgt>
                                         </p:tgtEl>
@@ -15881,7 +15731,7 @@
                                         <p:tgtEl>
                                           <p:spTgt spid="15">
                                             <p:txEl>
-                                              <p:pRg st="4" end="4"/>
+                                              <p:pRg st="5" end="5"/>
                                             </p:txEl>
                                           </p:spTgt>
                                         </p:tgtEl>
@@ -15930,7 +15780,7 @@
                                         <p:tgtEl>
                                           <p:spTgt spid="15">
                                             <p:txEl>
-                                              <p:pRg st="5" end="5"/>
+                                              <p:pRg st="6" end="6"/>
                                             </p:txEl>
                                           </p:spTgt>
                                         </p:tgtEl>
@@ -15972,55 +15822,6 @@
                                     <p:set>
                                       <p:cBhvr>
                                         <p:cTn id="30" dur="1" fill="hold">
-                                          <p:stCondLst>
-                                            <p:cond delay="0"/>
-                                          </p:stCondLst>
-                                        </p:cTn>
-                                        <p:tgtEl>
-                                          <p:spTgt spid="15">
-                                            <p:txEl>
-                                              <p:pRg st="6" end="6"/>
-                                            </p:txEl>
-                                          </p:spTgt>
-                                        </p:tgtEl>
-                                        <p:attrNameLst>
-                                          <p:attrName>style.visibility</p:attrName>
-                                        </p:attrNameLst>
-                                      </p:cBhvr>
-                                      <p:to>
-                                        <p:strVal val="visible"/>
-                                      </p:to>
-                                    </p:set>
-                                  </p:childTnLst>
-                                </p:cTn>
-                              </p:par>
-                            </p:childTnLst>
-                          </p:cTn>
-                        </p:par>
-                      </p:childTnLst>
-                    </p:cTn>
-                  </p:par>
-                  <p:par>
-                    <p:cTn id="31" fill="hold">
-                      <p:stCondLst>
-                        <p:cond delay="indefinite"/>
-                      </p:stCondLst>
-                      <p:childTnLst>
-                        <p:par>
-                          <p:cTn id="32" fill="hold">
-                            <p:stCondLst>
-                              <p:cond delay="0"/>
-                            </p:stCondLst>
-                            <p:childTnLst>
-                              <p:par>
-                                <p:cTn id="33" presetID="1" presetClass="entr" presetSubtype="0" fill="hold" nodeType="clickEffect">
-                                  <p:stCondLst>
-                                    <p:cond delay="0"/>
-                                  </p:stCondLst>
-                                  <p:childTnLst>
-                                    <p:set>
-                                      <p:cBhvr>
-                                        <p:cTn id="34" dur="1" fill="hold">
                                           <p:stCondLst>
                                             <p:cond delay="0"/>
                                           </p:stCondLst>
@@ -16188,7 +15989,7 @@
                 <a:hlinkClick r:id="rId3">
                   <a:extLst>
                     <a:ext uri="{A12FA001-AC4F-418D-AE19-62706E023703}">
-                      <ahyp:hlinkClr xmlns:ahyp="http://schemas.microsoft.com/office/drawing/2018/hyperlinkcolor" xmlns="" val="tx"/>
+                      <ahyp:hlinkClr xmlns:ahyp="http://schemas.microsoft.com/office/drawing/2018/hyperlinkcolor" val="tx"/>
                     </a:ext>
                   </a:extLst>
                 </a:hlinkClick>
@@ -16261,13 +16062,6 @@
       <p:transition spd="slow" advClick="0" advTm="5000"/>
     </mc:Fallback>
   </mc:AlternateContent>
-  <p:timing>
-    <p:tnLst>
-      <p:par>
-        <p:cTn id="1" dur="indefinite" restart="never" nodeType="tmRoot"/>
-      </p:par>
-    </p:tnLst>
-  </p:timing>
 </p:sld>
 </file>
 
@@ -16651,13 +16445,6 @@
       <p:transition spd="slow" advClick="0" advTm="5000"/>
     </mc:Fallback>
   </mc:AlternateContent>
-  <p:timing>
-    <p:tnLst>
-      <p:par>
-        <p:cTn id="1" dur="indefinite" restart="never" nodeType="tmRoot"/>
-      </p:par>
-    </p:tnLst>
-  </p:timing>
 </p:sld>
 </file>
 
@@ -16694,7 +16481,7 @@
           <a:lstStyle/>
           <a:p>
             <a:r>
-              <a:rPr lang="bg-BG" dirty="0" smtClean="0"/>
+              <a:rPr lang="bg-BG" dirty="0"/>
               <a:t>Основни характеристики</a:t>
             </a:r>
             <a:endParaRPr lang="en-US" dirty="0"/>
@@ -16721,38 +16508,6 @@
               <a:t>Въвеждане на текст</a:t>
             </a:r>
             <a:endParaRPr lang="en-US" dirty="0"/>
-          </a:p>
-        </p:txBody>
-      </p:sp>
-      <p:sp>
-        <p:nvSpPr>
-          <p:cNvPr id="2" name="Slide Number Placeholder 1"/>
-          <p:cNvSpPr>
-            <a:spLocks noGrp="1"/>
-          </p:cNvSpPr>
-          <p:nvPr>
-            <p:ph type="sldNum" sz="quarter" idx="4294967295"/>
-          </p:nvPr>
-        </p:nvSpPr>
-        <p:spPr>
-          <a:xfrm>
-            <a:off x="11823700" y="6507163"/>
-            <a:ext cx="368300" cy="296862"/>
-          </a:xfrm>
-          <a:prstGeom prst="rect">
-            <a:avLst/>
-          </a:prstGeom>
-        </p:spPr>
-        <p:txBody>
-          <a:bodyPr/>
-          <a:lstStyle/>
-          <a:p>
-            <a:fld id="{2BF067CD-8E6B-4360-9AA8-C5DF2A48A6D1}" type="slidenum">
-              <a:rPr lang="en-US" noProof="0" smtClean="0"/>
-              <a:pPr/>
-              <a:t>3</a:t>
-            </a:fld>
-            <a:endParaRPr lang="en-US" noProof="0"/>
           </a:p>
         </p:txBody>
       </p:sp>
@@ -16811,7 +16566,7 @@
           <a:p>
             <a:pPr algn="ctr"/>
             <a:r>
-              <a:rPr lang="en-US" sz="2800" b="1" dirty="0" smtClean="0">
+              <a:rPr lang="en-US" sz="2800" b="1" dirty="0">
                 <a:solidFill>
                   <a:srgbClr val="FFFFFF"/>
                 </a:solidFill>
@@ -16825,18 +16580,6 @@
               </a:rPr>
               <a:t>Lorem</a:t>
             </a:r>
-            <a:endParaRPr lang="en-US" sz="2800" b="1" dirty="0">
-              <a:solidFill>
-                <a:srgbClr val="FFFFFF"/>
-              </a:solidFill>
-              <a:effectLst>
-                <a:outerShdw blurRad="38100" dist="38100" dir="2700000" algn="tl">
-                  <a:srgbClr val="000000">
-                    <a:alpha val="43137"/>
-                  </a:srgbClr>
-                </a:outerShdw>
-              </a:effectLst>
-            </a:endParaRPr>
           </a:p>
         </p:txBody>
       </p:sp>
@@ -16858,13 +16601,6 @@
       <p:transition spd="slow" advClick="0" advTm="5000"/>
     </mc:Fallback>
   </mc:AlternateContent>
-  <p:timing>
-    <p:tnLst>
-      <p:par>
-        <p:cTn id="1" dur="indefinite" restart="never" nodeType="tmRoot"/>
-      </p:par>
-    </p:tnLst>
-  </p:timing>
 </p:sld>
 </file>
 
@@ -16906,23 +16642,23 @@
           <a:lstStyle/>
           <a:p>
             <a:r>
-              <a:rPr lang="bg-BG" dirty="0" smtClean="0"/>
+              <a:rPr lang="bg-BG" dirty="0"/>
               <a:t>Инструментът за </a:t>
             </a:r>
             <a:r>
-              <a:rPr lang="bg-BG" b="1" dirty="0" smtClean="0"/>
+              <a:rPr lang="bg-BG" b="1" dirty="0"/>
               <a:t>въвеждане на текст </a:t>
             </a:r>
             <a:r>
-              <a:rPr lang="bg-BG" dirty="0" smtClean="0"/>
+              <a:rPr lang="bg-BG" dirty="0"/>
               <a:t>се намира в </a:t>
             </a:r>
             <a:r>
-              <a:rPr lang="bg-BG" b="1" dirty="0" smtClean="0"/>
+              <a:rPr lang="bg-BG" b="1" dirty="0"/>
               <a:t>панела </a:t>
             </a:r>
             <a:r>
-              <a:rPr lang="en-US" b="1" dirty="0" smtClean="0">
+              <a:rPr lang="en-US" b="1" dirty="0">
                 <a:solidFill>
                   <a:schemeClr val="bg1"/>
                 </a:solidFill>
@@ -16930,55 +16666,55 @@
               <a:t>Tools</a:t>
             </a:r>
             <a:r>
-              <a:rPr lang="en-US" b="1" dirty="0" smtClean="0"/>
+              <a:rPr lang="en-US" b="1" dirty="0"/>
               <a:t> </a:t>
             </a:r>
           </a:p>
           <a:p>
             <a:r>
-              <a:rPr lang="bg-BG" dirty="0" smtClean="0"/>
+              <a:rPr lang="bg-BG" dirty="0"/>
               <a:t>След като сме избрали инструмента, </a:t>
             </a:r>
             <a:r>
-              <a:rPr lang="bg-BG" b="1" dirty="0" smtClean="0"/>
+              <a:rPr lang="bg-BG" b="1" dirty="0"/>
               <a:t>щракваме</a:t>
             </a:r>
             <a:r>
-              <a:rPr lang="bg-BG" dirty="0" smtClean="0"/>
+              <a:rPr lang="bg-BG" dirty="0"/>
               <a:t> на място в </a:t>
             </a:r>
             <a:r>
-              <a:rPr lang="bg-BG" b="1" dirty="0" smtClean="0"/>
+              <a:rPr lang="bg-BG" b="1" dirty="0"/>
               <a:t>работното поле</a:t>
             </a:r>
             <a:r>
-              <a:rPr lang="bg-BG" dirty="0" smtClean="0"/>
+              <a:rPr lang="bg-BG" dirty="0"/>
               <a:t>, където искаме да се </a:t>
             </a:r>
             <a:r>
-              <a:rPr lang="bg-BG" b="1" dirty="0" smtClean="0"/>
+              <a:rPr lang="bg-BG" b="1" dirty="0"/>
               <a:t>появи текстът</a:t>
             </a:r>
           </a:p>
           <a:p>
             <a:r>
-              <a:rPr lang="bg-BG" b="1" dirty="0" smtClean="0"/>
+              <a:rPr lang="bg-BG" b="1" dirty="0"/>
               <a:t>Въвеждаме</a:t>
             </a:r>
             <a:r>
-              <a:rPr lang="bg-BG" dirty="0" smtClean="0"/>
+              <a:rPr lang="bg-BG" dirty="0"/>
               <a:t> отделните </a:t>
             </a:r>
             <a:r>
-              <a:rPr lang="bg-BG" b="1" dirty="0" smtClean="0"/>
+              <a:rPr lang="bg-BG" b="1" dirty="0"/>
               <a:t>символи</a:t>
             </a:r>
             <a:r>
-              <a:rPr lang="bg-BG" dirty="0" smtClean="0"/>
+              <a:rPr lang="bg-BG" dirty="0"/>
               <a:t> с помощта на </a:t>
             </a:r>
             <a:r>
-              <a:rPr lang="bg-BG" b="1" dirty="0" smtClean="0"/>
+              <a:rPr lang="bg-BG" b="1" dirty="0"/>
               <a:t>клавиатурата</a:t>
             </a:r>
             <a:endParaRPr lang="en-US" b="1" dirty="0"/>
@@ -17001,7 +16737,7 @@
           <a:lstStyle/>
           <a:p>
             <a:r>
-              <a:rPr lang="bg-BG" dirty="0" smtClean="0"/>
+              <a:rPr lang="bg-BG" dirty="0"/>
               <a:t>Въвеждане на текст</a:t>
             </a:r>
             <a:endParaRPr lang="en-US" dirty="0"/>
@@ -17296,15 +17032,15 @@
           <a:lstStyle/>
           <a:p>
             <a:r>
-              <a:rPr lang="bg-BG" dirty="0" smtClean="0"/>
+              <a:rPr lang="bg-BG" dirty="0"/>
               <a:t>От </a:t>
             </a:r>
             <a:r>
-              <a:rPr lang="bg-BG" b="1" dirty="0" smtClean="0"/>
+              <a:rPr lang="bg-BG" b="1" dirty="0"/>
               <a:t>панела </a:t>
             </a:r>
             <a:r>
-              <a:rPr lang="en-US" b="1" dirty="0" smtClean="0">
+              <a:rPr lang="en-US" b="1" dirty="0">
                 <a:solidFill>
                   <a:schemeClr val="bg1"/>
                 </a:solidFill>
@@ -17312,19 +17048,19 @@
               <a:t>Font</a:t>
             </a:r>
             <a:r>
-              <a:rPr lang="en-US" b="1" dirty="0" smtClean="0"/>
+              <a:rPr lang="en-US" b="1" dirty="0"/>
               <a:t> </a:t>
             </a:r>
             <a:r>
-              <a:rPr lang="bg-BG" dirty="0" smtClean="0"/>
+              <a:rPr lang="bg-BG" dirty="0"/>
               <a:t>в новото </a:t>
             </a:r>
             <a:r>
-              <a:rPr lang="bg-BG" b="1" dirty="0" smtClean="0"/>
+              <a:rPr lang="bg-BG" b="1" dirty="0"/>
               <a:t>менюто </a:t>
             </a:r>
             <a:r>
-              <a:rPr lang="en-US" b="1" dirty="0" smtClean="0">
+              <a:rPr lang="en-US" b="1" dirty="0">
                 <a:solidFill>
                   <a:schemeClr val="bg1"/>
                 </a:solidFill>
@@ -17332,11 +17068,11 @@
               <a:t>Text</a:t>
             </a:r>
             <a:r>
-              <a:rPr lang="en-US" b="1" dirty="0" smtClean="0"/>
+              <a:rPr lang="en-US" b="1" dirty="0"/>
               <a:t> </a:t>
             </a:r>
             <a:r>
-              <a:rPr lang="bg-BG" dirty="0" smtClean="0"/>
+              <a:rPr lang="bg-BG" dirty="0"/>
               <a:t>може да задавате:</a:t>
             </a:r>
           </a:p>
@@ -17358,7 +17094,7 @@
           <a:lstStyle/>
           <a:p>
             <a:r>
-              <a:rPr lang="bg-BG" dirty="0" smtClean="0"/>
+              <a:rPr lang="bg-BG" dirty="0"/>
               <a:t>Характеристики на текст (1)</a:t>
             </a:r>
             <a:endParaRPr lang="en-US" dirty="0"/>
@@ -17393,6 +17129,13 @@
           <a:prstGeom prst="rect">
             <a:avLst/>
           </a:prstGeom>
+          <a:ln>
+            <a:solidFill>
+              <a:schemeClr val="bg2">
+                <a:lumMod val="75000"/>
+              </a:schemeClr>
+            </a:solidFill>
+          </a:ln>
         </p:spPr>
       </p:pic>
       <p:sp>
@@ -17455,7 +17198,7 @@
           <a:p>
             <a:pPr algn="ctr"/>
             <a:r>
-              <a:rPr lang="bg-BG" sz="2800" b="1" dirty="0" smtClean="0">
+              <a:rPr lang="bg-BG" sz="2800" b="1" dirty="0">
                 <a:solidFill>
                   <a:srgbClr val="FFFFFF"/>
                 </a:solidFill>
@@ -17544,7 +17287,7 @@
           <a:p>
             <a:pPr algn="ctr"/>
             <a:r>
-              <a:rPr lang="bg-BG" sz="2800" b="1" dirty="0" smtClean="0">
+              <a:rPr lang="bg-BG" sz="2800" b="1" dirty="0">
                 <a:solidFill>
                   <a:srgbClr val="FFFFFF"/>
                 </a:solidFill>
@@ -17633,7 +17376,7 @@
           <a:p>
             <a:pPr algn="ctr"/>
             <a:r>
-              <a:rPr lang="bg-BG" sz="2800" b="1" dirty="0" smtClean="0">
+              <a:rPr lang="bg-BG" sz="2800" b="1" dirty="0">
                 <a:solidFill>
                   <a:srgbClr val="FFFFFF"/>
                 </a:solidFill>
@@ -18027,15 +17770,15 @@
           <a:lstStyle/>
           <a:p>
             <a:r>
-              <a:rPr lang="bg-BG" dirty="0" smtClean="0"/>
+              <a:rPr lang="bg-BG" dirty="0"/>
               <a:t>От </a:t>
             </a:r>
             <a:r>
-              <a:rPr lang="bg-BG" b="1" dirty="0" smtClean="0"/>
+              <a:rPr lang="bg-BG" b="1" dirty="0"/>
               <a:t>панела </a:t>
             </a:r>
             <a:r>
-              <a:rPr lang="en-US" b="1" dirty="0" smtClean="0">
+              <a:rPr lang="en-US" b="1" dirty="0">
                 <a:solidFill>
                   <a:schemeClr val="bg1"/>
                 </a:solidFill>
@@ -18043,19 +17786,19 @@
               <a:t>Colors</a:t>
             </a:r>
             <a:r>
-              <a:rPr lang="en-US" b="1" dirty="0" smtClean="0"/>
+              <a:rPr lang="en-US" b="1" dirty="0"/>
               <a:t> </a:t>
             </a:r>
             <a:r>
-              <a:rPr lang="bg-BG" dirty="0" smtClean="0"/>
+              <a:rPr lang="bg-BG" dirty="0"/>
               <a:t>в </a:t>
             </a:r>
             <a:r>
-              <a:rPr lang="bg-BG" b="1" dirty="0" smtClean="0"/>
+              <a:rPr lang="bg-BG" b="1" dirty="0"/>
               <a:t>менюто </a:t>
             </a:r>
             <a:r>
-              <a:rPr lang="en-US" b="1" dirty="0" smtClean="0">
+              <a:rPr lang="en-US" b="1" dirty="0">
                 <a:solidFill>
                   <a:schemeClr val="bg1"/>
                 </a:solidFill>
@@ -18063,11 +17806,11 @@
               <a:t>Text</a:t>
             </a:r>
             <a:r>
-              <a:rPr lang="en-US" dirty="0" smtClean="0"/>
+              <a:rPr lang="en-US" dirty="0"/>
               <a:t> </a:t>
             </a:r>
             <a:r>
-              <a:rPr lang="bg-BG" dirty="0" smtClean="0"/>
+              <a:rPr lang="bg-BG" dirty="0"/>
               <a:t>се задава цвета на символите:</a:t>
             </a:r>
           </a:p>
@@ -18093,11 +17836,7 @@
           <a:p>
             <a:r>
               <a:rPr lang="bg-BG" dirty="0"/>
-              <a:t>Характеристики на </a:t>
-            </a:r>
-            <a:r>
-              <a:rPr lang="bg-BG" dirty="0" smtClean="0"/>
-              <a:t>текст (2)</a:t>
+              <a:t>Характеристики на текст (2)</a:t>
             </a:r>
             <a:endParaRPr lang="en-US" dirty="0"/>
           </a:p>
@@ -18193,7 +17932,7 @@
           <a:p>
             <a:pPr algn="ctr"/>
             <a:r>
-              <a:rPr lang="en-US" sz="2800" b="1" dirty="0" smtClean="0">
+              <a:rPr lang="en-US" sz="2800" b="1" dirty="0">
                 <a:solidFill>
                   <a:srgbClr val="FFFFFF"/>
                 </a:solidFill>
@@ -18208,7 +17947,7 @@
               <a:t>Color </a:t>
             </a:r>
             <a:r>
-              <a:rPr lang="bg-BG" sz="2800" b="1" dirty="0" smtClean="0">
+              <a:rPr lang="bg-BG" sz="2800" b="1" dirty="0">
                 <a:solidFill>
                   <a:srgbClr val="FFFFFF"/>
                 </a:solidFill>
@@ -18297,7 +18036,7 @@
           <a:p>
             <a:pPr algn="ctr"/>
             <a:r>
-              <a:rPr lang="en-US" sz="2800" b="1" dirty="0" smtClean="0">
+              <a:rPr lang="en-US" sz="2800" b="1" dirty="0">
                 <a:solidFill>
                   <a:srgbClr val="FFFFFF"/>
                 </a:solidFill>
@@ -18312,7 +18051,7 @@
               <a:t>Color </a:t>
             </a:r>
             <a:r>
-              <a:rPr lang="bg-BG" sz="2800" b="1" dirty="0" smtClean="0">
+              <a:rPr lang="bg-BG" sz="2800" b="1" dirty="0">
                 <a:solidFill>
                   <a:srgbClr val="FFFFFF"/>
                 </a:solidFill>
@@ -18543,23 +18282,23 @@
           <a:lstStyle/>
           <a:p>
             <a:r>
-              <a:rPr lang="bg-BG" dirty="0" smtClean="0"/>
+              <a:rPr lang="bg-BG" dirty="0"/>
               <a:t>Може да настройвате </a:t>
             </a:r>
             <a:r>
-              <a:rPr lang="bg-BG" b="1" dirty="0" smtClean="0"/>
-              <a:t>фонът </a:t>
-            </a:r>
-            <a:r>
-              <a:rPr lang="bg-BG" dirty="0" smtClean="0"/>
+              <a:rPr lang="bg-BG" b="1" dirty="0"/>
+              <a:t>фона </a:t>
+            </a:r>
+            <a:r>
+              <a:rPr lang="bg-BG" dirty="0"/>
               <a:t>(текстовата кутия), като използвате </a:t>
             </a:r>
             <a:r>
-              <a:rPr lang="bg-BG" b="1" dirty="0" smtClean="0"/>
+              <a:rPr lang="bg-BG" b="1" dirty="0"/>
               <a:t>панела </a:t>
             </a:r>
             <a:r>
-              <a:rPr lang="en-US" b="1" dirty="0" smtClean="0">
+              <a:rPr lang="en-US" b="1" dirty="0">
                 <a:solidFill>
                   <a:schemeClr val="bg1"/>
                 </a:solidFill>
@@ -18570,11 +18309,11 @@
           <a:p>
             <a:pPr lvl="1"/>
             <a:r>
-              <a:rPr lang="en-US" dirty="0" smtClean="0"/>
+              <a:rPr lang="en-US" dirty="0"/>
               <a:t>͏</a:t>
             </a:r>
             <a:r>
-              <a:rPr lang="en-US" b="1" dirty="0" smtClean="0">
+              <a:rPr lang="en-US" b="1" dirty="0">
                 <a:solidFill>
                   <a:schemeClr val="bg1"/>
                 </a:solidFill>
@@ -18582,39 +18321,39 @@
               <a:t>Opaque</a:t>
             </a:r>
             <a:r>
-              <a:rPr lang="en-US" dirty="0" smtClean="0"/>
+              <a:rPr lang="en-US" dirty="0"/>
               <a:t> – </a:t>
             </a:r>
             <a:r>
-              <a:rPr lang="bg-BG" b="1" dirty="0" smtClean="0"/>
+              <a:rPr lang="bg-BG" b="1" dirty="0"/>
               <a:t>текстът</a:t>
             </a:r>
             <a:r>
-              <a:rPr lang="bg-BG" dirty="0" smtClean="0"/>
+              <a:rPr lang="bg-BG" dirty="0"/>
               <a:t> и </a:t>
             </a:r>
             <a:r>
-              <a:rPr lang="bg-BG" b="1" dirty="0" smtClean="0"/>
+              <a:rPr lang="bg-BG" b="1" dirty="0"/>
               <a:t>фонът</a:t>
             </a:r>
             <a:r>
-              <a:rPr lang="bg-BG" dirty="0" smtClean="0"/>
+              <a:rPr lang="bg-BG" dirty="0"/>
               <a:t> са </a:t>
             </a:r>
             <a:r>
-              <a:rPr lang="bg-BG" b="1" dirty="0" smtClean="0"/>
+              <a:rPr lang="bg-BG" b="1" dirty="0"/>
               <a:t>цветовете</a:t>
             </a:r>
             <a:r>
-              <a:rPr lang="bg-BG" dirty="0" smtClean="0"/>
+              <a:rPr lang="bg-BG" dirty="0"/>
               <a:t>, които са зададени от </a:t>
             </a:r>
             <a:r>
-              <a:rPr lang="bg-BG" b="1" dirty="0" smtClean="0"/>
+              <a:rPr lang="bg-BG" b="1" dirty="0"/>
               <a:t>панела </a:t>
             </a:r>
             <a:r>
-              <a:rPr lang="en-US" b="1" dirty="0" smtClean="0">
+              <a:rPr lang="en-US" b="1" dirty="0">
                 <a:solidFill>
                   <a:schemeClr val="bg1"/>
                 </a:solidFill>
@@ -18622,30 +18361,30 @@
               <a:t>Color</a:t>
             </a:r>
             <a:r>
-              <a:rPr lang="bg-BG" b="1" dirty="0" smtClean="0"/>
+              <a:rPr lang="bg-BG" b="1" dirty="0"/>
               <a:t> </a:t>
             </a:r>
             <a:r>
-              <a:rPr lang="bg-BG" dirty="0" smtClean="0"/>
+              <a:rPr lang="bg-BG" dirty="0"/>
               <a:t>(това, което е под тях, </a:t>
             </a:r>
             <a:r>
-              <a:rPr lang="bg-BG" b="1" dirty="0" smtClean="0"/>
+              <a:rPr lang="bg-BG" b="1" dirty="0"/>
               <a:t>не се вижда</a:t>
             </a:r>
             <a:r>
-              <a:rPr lang="bg-BG" dirty="0" smtClean="0"/>
+              <a:rPr lang="bg-BG" dirty="0"/>
               <a:t>)</a:t>
             </a:r>
           </a:p>
           <a:p>
             <a:pPr lvl="1"/>
             <a:r>
-              <a:rPr lang="en-US" dirty="0" smtClean="0"/>
+              <a:rPr lang="en-US" dirty="0"/>
               <a:t>͏</a:t>
             </a:r>
             <a:r>
-              <a:rPr lang="en-US" b="1" dirty="0" smtClean="0">
+              <a:rPr lang="en-US" b="1" dirty="0">
                 <a:solidFill>
                   <a:schemeClr val="bg1"/>
                 </a:solidFill>
@@ -18653,31 +18392,31 @@
               <a:t>Transparent</a:t>
             </a:r>
             <a:r>
-              <a:rPr lang="en-US" dirty="0" smtClean="0"/>
+              <a:rPr lang="en-US" dirty="0"/>
               <a:t> – </a:t>
             </a:r>
             <a:r>
-              <a:rPr lang="bg-BG" b="1" dirty="0" smtClean="0"/>
+              <a:rPr lang="bg-BG" b="1" dirty="0"/>
               <a:t>фонът</a:t>
             </a:r>
             <a:r>
-              <a:rPr lang="bg-BG" dirty="0" smtClean="0"/>
+              <a:rPr lang="bg-BG" dirty="0"/>
               <a:t> е </a:t>
             </a:r>
             <a:r>
-              <a:rPr lang="bg-BG" b="1" dirty="0" smtClean="0"/>
+              <a:rPr lang="bg-BG" b="1" dirty="0"/>
               <a:t>прозрачен</a:t>
             </a:r>
             <a:r>
-              <a:rPr lang="bg-BG" dirty="0" smtClean="0"/>
+              <a:rPr lang="bg-BG" dirty="0"/>
               <a:t> и се вижда </a:t>
             </a:r>
             <a:r>
-              <a:rPr lang="bg-BG" b="1" dirty="0" smtClean="0"/>
+              <a:rPr lang="bg-BG" b="1" dirty="0"/>
               <a:t>само текстът </a:t>
             </a:r>
             <a:r>
-              <a:rPr lang="bg-BG" dirty="0" smtClean="0"/>
+              <a:rPr lang="bg-BG" dirty="0"/>
               <a:t>с цвета, който е избран</a:t>
             </a:r>
           </a:p>
@@ -18700,11 +18439,7 @@
           <a:p>
             <a:r>
               <a:rPr lang="bg-BG" dirty="0"/>
-              <a:t>Характеристики на текст </a:t>
-            </a:r>
-            <a:r>
-              <a:rPr lang="bg-BG" dirty="0" smtClean="0"/>
-              <a:t>(3)</a:t>
+              <a:t>Характеристики на текст (3)</a:t>
             </a:r>
             <a:endParaRPr lang="en-US" dirty="0"/>
           </a:p>
@@ -18998,15 +18733,15 @@
           <a:lstStyle/>
           <a:p>
             <a:r>
-              <a:rPr lang="bg-BG" dirty="0" smtClean="0"/>
+              <a:rPr lang="bg-BG" dirty="0"/>
               <a:t>Отворете </a:t>
             </a:r>
             <a:r>
-              <a:rPr lang="bg-BG" b="1" dirty="0" smtClean="0"/>
+              <a:rPr lang="bg-BG" b="1" dirty="0"/>
               <a:t>програмата </a:t>
             </a:r>
             <a:r>
-              <a:rPr lang="en-US" b="1" dirty="0" smtClean="0">
+              <a:rPr lang="en-US" b="1" dirty="0">
                 <a:solidFill>
                   <a:schemeClr val="bg1"/>
                 </a:solidFill>
@@ -19014,60 +18749,56 @@
               <a:t>Paint</a:t>
             </a:r>
             <a:r>
-              <a:rPr lang="bg-BG" dirty="0" smtClean="0"/>
+              <a:rPr lang="bg-BG" dirty="0"/>
               <a:t>. Изчертайте фигурите: </a:t>
             </a:r>
             <a:r>
-              <a:rPr lang="bg-BG" b="1" dirty="0" smtClean="0"/>
+              <a:rPr lang="bg-BG" b="1" dirty="0"/>
               <a:t>триъгълник</a:t>
             </a:r>
             <a:r>
-              <a:rPr lang="bg-BG" dirty="0" smtClean="0"/>
+              <a:rPr lang="bg-BG" dirty="0"/>
               <a:t>, </a:t>
             </a:r>
             <a:r>
-              <a:rPr lang="bg-BG" b="1" dirty="0" smtClean="0"/>
+              <a:rPr lang="bg-BG" b="1" dirty="0"/>
               <a:t>квадрат</a:t>
             </a:r>
             <a:r>
-              <a:rPr lang="bg-BG" dirty="0" smtClean="0"/>
+              <a:rPr lang="bg-BG" dirty="0"/>
               <a:t>, </a:t>
             </a:r>
             <a:r>
-              <a:rPr lang="bg-BG" b="1" dirty="0" smtClean="0"/>
+              <a:rPr lang="bg-BG" b="1" dirty="0"/>
               <a:t>правоъгълник</a:t>
             </a:r>
             <a:r>
-              <a:rPr lang="bg-BG" dirty="0" smtClean="0"/>
+              <a:rPr lang="bg-BG" dirty="0"/>
               <a:t>, </a:t>
             </a:r>
             <a:r>
-              <a:rPr lang="bg-BG" b="1" dirty="0" smtClean="0"/>
+              <a:rPr lang="bg-BG" b="1" dirty="0"/>
               <a:t>окръжност</a:t>
             </a:r>
             <a:r>
-              <a:rPr lang="bg-BG" dirty="0" smtClean="0"/>
+              <a:rPr lang="bg-BG" dirty="0"/>
               <a:t>. Всяка фигура трябва да е </a:t>
             </a:r>
             <a:r>
-              <a:rPr lang="bg-BG" b="1" dirty="0" smtClean="0"/>
+              <a:rPr lang="bg-BG" b="1" dirty="0"/>
               <a:t>запълнена</a:t>
             </a:r>
             <a:r>
-              <a:rPr lang="bg-BG" dirty="0" smtClean="0"/>
+              <a:rPr lang="bg-BG" dirty="0"/>
               <a:t> с </a:t>
             </a:r>
             <a:r>
-              <a:rPr lang="bg-BG" b="1" dirty="0" smtClean="0"/>
+              <a:rPr lang="bg-BG" b="1" dirty="0"/>
               <a:t>различен цвят</a:t>
             </a:r>
             <a:r>
-              <a:rPr lang="bg-BG" dirty="0" smtClean="0"/>
-              <a:t>. </a:t>
-            </a:r>
-            <a:r>
               <a:rPr lang="bg-BG" dirty="0"/>
-              <a:t>Добавете </a:t>
+              <a:t>. Добавете </a:t>
             </a:r>
             <a:r>
               <a:rPr lang="bg-BG" b="1" dirty="0"/>
@@ -19083,34 +18814,30 @@
             </a:r>
             <a:r>
               <a:rPr lang="bg-BG" dirty="0"/>
-              <a:t>под </a:t>
-            </a:r>
-            <a:r>
-              <a:rPr lang="bg-BG" dirty="0" smtClean="0"/>
-              <a:t>нея, като </a:t>
-            </a:r>
-            <a:r>
-              <a:rPr lang="bg-BG" b="1" dirty="0" smtClean="0"/>
+              <a:t>под нея, като </a:t>
+            </a:r>
+            <a:r>
+              <a:rPr lang="bg-BG" b="1" dirty="0"/>
               <a:t>цвета</a:t>
             </a:r>
             <a:r>
-              <a:rPr lang="bg-BG" dirty="0" smtClean="0"/>
+              <a:rPr lang="bg-BG" dirty="0"/>
               <a:t> на </a:t>
             </a:r>
             <a:r>
-              <a:rPr lang="bg-BG" b="1" dirty="0" smtClean="0"/>
+              <a:rPr lang="bg-BG" b="1" dirty="0"/>
               <a:t>текста</a:t>
             </a:r>
             <a:r>
-              <a:rPr lang="bg-BG" dirty="0" smtClean="0"/>
+              <a:rPr lang="bg-BG" dirty="0"/>
               <a:t> съответства с този, който е </a:t>
             </a:r>
             <a:r>
-              <a:rPr lang="bg-BG" b="1" dirty="0" smtClean="0"/>
+              <a:rPr lang="bg-BG" b="1" dirty="0"/>
               <a:t>запълнена фигурата</a:t>
             </a:r>
             <a:r>
-              <a:rPr lang="bg-BG" dirty="0" smtClean="0"/>
+              <a:rPr lang="bg-BG" dirty="0"/>
               <a:t>.</a:t>
             </a:r>
             <a:endParaRPr lang="en-US" dirty="0"/>
@@ -19133,7 +18860,7 @@
           <a:lstStyle/>
           <a:p>
             <a:r>
-              <a:rPr lang="bg-BG" dirty="0" smtClean="0"/>
+              <a:rPr lang="bg-BG" dirty="0"/>
               <a:t>Задача: Фигури</a:t>
             </a:r>
             <a:endParaRPr lang="en-US" dirty="0"/>
@@ -19188,13 +18915,6 @@
       <p:transition spd="slow" advClick="0" advTm="5000"/>
     </mc:Fallback>
   </mc:AlternateContent>
-  <p:timing>
-    <p:tnLst>
-      <p:par>
-        <p:cTn id="1" dur="indefinite" restart="never" nodeType="tmRoot"/>
-      </p:par>
-    </p:tnLst>
-  </p:timing>
 </p:sld>
 </file>
 
@@ -19255,19 +18975,19 @@
           <a:lstStyle/>
           <a:p>
             <a:r>
-              <a:rPr lang="bg-BG" dirty="0" smtClean="0"/>
+              <a:rPr lang="bg-BG" dirty="0"/>
               <a:t>Отворете </a:t>
             </a:r>
             <a:r>
-              <a:rPr lang="bg-BG" b="1" dirty="0" smtClean="0"/>
+              <a:rPr lang="bg-BG" b="1" dirty="0"/>
               <a:t>изображението</a:t>
             </a:r>
             <a:r>
-              <a:rPr lang="bg-BG" dirty="0" smtClean="0"/>
+              <a:rPr lang="bg-BG" dirty="0"/>
               <a:t> </a:t>
             </a:r>
             <a:r>
-              <a:rPr lang="en-US" b="1" dirty="0" smtClean="0">
+              <a:rPr lang="en-US" b="1" dirty="0">
                 <a:solidFill>
                   <a:schemeClr val="bg1"/>
                 </a:solidFill>
@@ -19295,23 +19015,23 @@
               <a:t> </a:t>
             </a:r>
             <a:r>
-              <a:rPr lang="bg-BG" smtClean="0"/>
+              <a:rPr lang="bg-BG"/>
               <a:t>и </a:t>
             </a:r>
             <a:r>
-              <a:rPr lang="bg-BG" dirty="0" smtClean="0"/>
+              <a:rPr lang="bg-BG" dirty="0"/>
               <a:t>го </a:t>
             </a:r>
             <a:r>
-              <a:rPr lang="bg-BG" b="1" dirty="0" smtClean="0"/>
+              <a:rPr lang="bg-BG" b="1" dirty="0"/>
               <a:t>пресъздайте</a:t>
             </a:r>
             <a:r>
-              <a:rPr lang="bg-BG" dirty="0" smtClean="0"/>
+              <a:rPr lang="bg-BG" dirty="0"/>
               <a:t> в </a:t>
             </a:r>
             <a:r>
-              <a:rPr lang="en-US" b="1" dirty="0" smtClean="0">
+              <a:rPr lang="en-US" b="1" dirty="0">
                 <a:solidFill>
                   <a:schemeClr val="bg1"/>
                 </a:solidFill>
@@ -19319,19 +19039,19 @@
               <a:t>Paint</a:t>
             </a:r>
             <a:r>
-              <a:rPr lang="en-US" dirty="0" smtClean="0"/>
+              <a:rPr lang="en-US" dirty="0"/>
               <a:t>, </a:t>
             </a:r>
             <a:r>
-              <a:rPr lang="bg-BG" dirty="0" smtClean="0"/>
+              <a:rPr lang="bg-BG" dirty="0"/>
               <a:t>като използвате </a:t>
             </a:r>
             <a:r>
-              <a:rPr lang="bg-BG" b="1" dirty="0" smtClean="0"/>
+              <a:rPr lang="bg-BG" b="1" dirty="0"/>
               <a:t>подходящите инстументи</a:t>
             </a:r>
             <a:r>
-              <a:rPr lang="bg-BG" dirty="0" smtClean="0"/>
+              <a:rPr lang="bg-BG" dirty="0"/>
               <a:t>.</a:t>
             </a:r>
             <a:endParaRPr lang="en-US" dirty="0"/>
@@ -19354,7 +19074,7 @@
           <a:lstStyle/>
           <a:p>
             <a:r>
-              <a:rPr lang="bg-BG" dirty="0" smtClean="0"/>
+              <a:rPr lang="bg-BG" dirty="0"/>
               <a:t>Задача: Пътен знак</a:t>
             </a:r>
             <a:endParaRPr lang="en-US" dirty="0"/>
@@ -19409,13 +19129,6 @@
       <p:transition spd="slow" advClick="0" advTm="5000"/>
     </mc:Fallback>
   </mc:AlternateContent>
-  <p:timing>
-    <p:tnLst>
-      <p:par>
-        <p:cTn id="1" dur="indefinite" restart="never" nodeType="tmRoot"/>
-      </p:par>
-    </p:tnLst>
-  </p:timing>
 </p:sld>
 </file>
 

</xml_diff>

<commit_message>
Updates on "14. Convert and Insert Text into a Graphic Image" slides
</commit_message>
<xml_diff>
--- a/Courses/Computer-Modeling-and-IT/Computer-Modeling-and-IT-5-Class/14-Convert-and-Insert-Text-Into-a-Graphic-Image/14-Convert-and-Insert-Text-Into-a-Graphic-Image.pptx
+++ b/Courses/Computer-Modeling-and-IT/Computer-Modeling-and-IT-5-Class/14-Convert-and-Insert-Text-Into-a-Graphic-Image/14-Convert-and-Insert-Text-Into-a-Graphic-Image.pptx
@@ -5,38 +5,39 @@
     <p:sldMasterId id="2147483675" r:id="rId1"/>
   </p:sldMasterIdLst>
   <p:notesMasterIdLst>
-    <p:notesMasterId r:id="rId28"/>
+    <p:notesMasterId r:id="rId29"/>
   </p:notesMasterIdLst>
   <p:handoutMasterIdLst>
-    <p:handoutMasterId r:id="rId29"/>
+    <p:handoutMasterId r:id="rId30"/>
   </p:handoutMasterIdLst>
   <p:sldIdLst>
     <p:sldId id="503" r:id="rId2"/>
     <p:sldId id="276" r:id="rId3"/>
     <p:sldId id="603" r:id="rId4"/>
     <p:sldId id="604" r:id="rId5"/>
-    <p:sldId id="605" r:id="rId6"/>
-    <p:sldId id="606" r:id="rId7"/>
-    <p:sldId id="607" r:id="rId8"/>
-    <p:sldId id="608" r:id="rId9"/>
-    <p:sldId id="609" r:id="rId10"/>
-    <p:sldId id="610" r:id="rId11"/>
-    <p:sldId id="611" r:id="rId12"/>
-    <p:sldId id="615" r:id="rId13"/>
-    <p:sldId id="612" r:id="rId14"/>
-    <p:sldId id="613" r:id="rId15"/>
-    <p:sldId id="614" r:id="rId16"/>
-    <p:sldId id="616" r:id="rId17"/>
-    <p:sldId id="617" r:id="rId18"/>
-    <p:sldId id="618" r:id="rId19"/>
-    <p:sldId id="620" r:id="rId20"/>
-    <p:sldId id="621" r:id="rId21"/>
-    <p:sldId id="623" r:id="rId22"/>
-    <p:sldId id="625" r:id="rId23"/>
-    <p:sldId id="626" r:id="rId24"/>
-    <p:sldId id="602" r:id="rId25"/>
-    <p:sldId id="504" r:id="rId26"/>
-    <p:sldId id="505" r:id="rId27"/>
+    <p:sldId id="627" r:id="rId6"/>
+    <p:sldId id="605" r:id="rId7"/>
+    <p:sldId id="606" r:id="rId8"/>
+    <p:sldId id="607" r:id="rId9"/>
+    <p:sldId id="608" r:id="rId10"/>
+    <p:sldId id="609" r:id="rId11"/>
+    <p:sldId id="610" r:id="rId12"/>
+    <p:sldId id="611" r:id="rId13"/>
+    <p:sldId id="615" r:id="rId14"/>
+    <p:sldId id="612" r:id="rId15"/>
+    <p:sldId id="613" r:id="rId16"/>
+    <p:sldId id="614" r:id="rId17"/>
+    <p:sldId id="616" r:id="rId18"/>
+    <p:sldId id="617" r:id="rId19"/>
+    <p:sldId id="618" r:id="rId20"/>
+    <p:sldId id="620" r:id="rId21"/>
+    <p:sldId id="621" r:id="rId22"/>
+    <p:sldId id="623" r:id="rId23"/>
+    <p:sldId id="625" r:id="rId24"/>
+    <p:sldId id="626" r:id="rId25"/>
+    <p:sldId id="602" r:id="rId26"/>
+    <p:sldId id="504" r:id="rId27"/>
+    <p:sldId id="505" r:id="rId28"/>
   </p:sldIdLst>
   <p:sldSz cx="12192000" cy="6858000"/>
   <p:notesSz cx="6858000" cy="9144000"/>
@@ -148,6 +149,7 @@
           <p14:sldIdLst>
             <p14:sldId id="603"/>
             <p14:sldId id="604"/>
+            <p14:sldId id="627"/>
             <p14:sldId id="605"/>
             <p14:sldId id="606"/>
             <p14:sldId id="607"/>
@@ -301,7 +303,7 @@
           <a:p>
             <a:fld id="{4E087215-0C8F-4762-A664-737A353EC9A4}" type="datetimeFigureOut">
               <a:rPr lang="bg-BG" smtClean="0"/>
-              <a:t>4.1.2024 г.</a:t>
+              <a:t>16.01.24 г.</a:t>
             </a:fld>
             <a:endParaRPr lang="bg-BG"/>
           </a:p>
@@ -497,7 +499,7 @@
           <a:p>
             <a:fld id="{72D84649-876A-46C9-8472-14CB09C070D8}" type="datetimeFigureOut">
               <a:rPr lang="en-US" smtClean="0"/>
-              <a:t>1/4/2024</a:t>
+              <a:t>1/16/24</a:t>
             </a:fld>
             <a:endParaRPr lang="en-US"/>
           </a:p>
@@ -1282,7 +1284,7 @@
             <a:fld id="{3EBA5BD7-F043-4D1B-AA17-CD412FC534DE}" type="slidenum">
               <a:rPr lang="en-US" smtClean="0"/>
               <a:pPr/>
-              <a:t>24</a:t>
+              <a:t>25</a:t>
             </a:fld>
             <a:endParaRPr lang="en-US" dirty="0"/>
           </a:p>
@@ -1473,7 +1475,7 @@
             <a:fld id="{3EBA5BD7-F043-4D1B-AA17-CD412FC534DE}" type="slidenum">
               <a:rPr lang="en-US" smtClean="0"/>
               <a:pPr/>
-              <a:t>25</a:t>
+              <a:t>26</a:t>
             </a:fld>
             <a:endParaRPr lang="en-US" dirty="0"/>
           </a:p>
@@ -1703,7 +1705,7 @@
             <a:fld id="{3EBA5BD7-F043-4D1B-AA17-CD412FC534DE}" type="slidenum">
               <a:rPr lang="en-US" smtClean="0"/>
               <a:pPr/>
-              <a:t>26</a:t>
+              <a:t>27</a:t>
             </a:fld>
             <a:endParaRPr lang="en-US" dirty="0"/>
           </a:p>
@@ -4237,7 +4239,7 @@
             <a:fld id="{055373AC-9AA7-423B-BA00-BA1C74164DBD}" type="datetime1">
               <a:rPr lang="en-US" smtClean="0"/>
               <a:pPr/>
-              <a:t>1/4/2024</a:t>
+              <a:t>1/16/24</a:t>
             </a:fld>
             <a:endParaRPr lang="en-US" dirty="0"/>
           </a:p>
@@ -7930,6 +7932,220 @@
       </p:grpSpPr>
       <p:sp>
         <p:nvSpPr>
+          <p:cNvPr id="2" name="Slide Number Placeholder 1"/>
+          <p:cNvSpPr>
+            <a:spLocks noGrp="1"/>
+          </p:cNvSpPr>
+          <p:nvPr>
+            <p:ph type="sldNum" sz="quarter" idx="5"/>
+          </p:nvPr>
+        </p:nvSpPr>
+        <p:spPr/>
+        <p:txBody>
+          <a:bodyPr/>
+          <a:lstStyle/>
+          <a:p>
+            <a:fld id="{2BF067CD-8E6B-4360-9AA8-C5DF2A48A6D1}" type="slidenum">
+              <a:rPr lang="en-US" noProof="0" smtClean="0"/>
+              <a:pPr/>
+              <a:t>10</a:t>
+            </a:fld>
+            <a:endParaRPr lang="en-US" noProof="0" dirty="0"/>
+          </a:p>
+        </p:txBody>
+      </p:sp>
+      <p:sp>
+        <p:nvSpPr>
+          <p:cNvPr id="3" name="Text Placeholder 2"/>
+          <p:cNvSpPr>
+            <a:spLocks noGrp="1"/>
+          </p:cNvSpPr>
+          <p:nvPr>
+            <p:ph type="body" sz="quarter" idx="10"/>
+          </p:nvPr>
+        </p:nvSpPr>
+        <p:spPr/>
+        <p:txBody>
+          <a:bodyPr/>
+          <a:lstStyle/>
+          <a:p>
+            <a:r>
+              <a:rPr lang="bg-BG" dirty="0"/>
+              <a:t>Отворете </a:t>
+            </a:r>
+            <a:r>
+              <a:rPr lang="bg-BG" b="1" dirty="0"/>
+              <a:t>изображението</a:t>
+            </a:r>
+            <a:r>
+              <a:rPr lang="bg-BG" dirty="0"/>
+              <a:t> </a:t>
+            </a:r>
+            <a:r>
+              <a:rPr lang="en-US" b="1" dirty="0">
+                <a:solidFill>
+                  <a:schemeClr val="bg1"/>
+                </a:solidFill>
+              </a:rPr>
+              <a:t>sign.jpg </a:t>
+            </a:r>
+            <a:r>
+              <a:rPr lang="bg-BG" dirty="0"/>
+              <a:t>в </a:t>
+            </a:r>
+            <a:r>
+              <a:rPr lang="bg-BG" b="1" dirty="0"/>
+              <a:t>папката </a:t>
+            </a:r>
+            <a:r>
+              <a:rPr lang="en-US" b="1">
+                <a:solidFill>
+                  <a:schemeClr val="bg1"/>
+                </a:solidFill>
+              </a:rPr>
+              <a:t>Resources</a:t>
+            </a:r>
+            <a:r>
+              <a:rPr lang="en-US" b="1"/>
+              <a:t> </a:t>
+            </a:r>
+            <a:r>
+              <a:rPr lang="bg-BG"/>
+              <a:t>и </a:t>
+            </a:r>
+            <a:r>
+              <a:rPr lang="bg-BG" dirty="0"/>
+              <a:t>го </a:t>
+            </a:r>
+            <a:r>
+              <a:rPr lang="bg-BG" b="1" dirty="0"/>
+              <a:t>пресъздайте</a:t>
+            </a:r>
+            <a:r>
+              <a:rPr lang="bg-BG" dirty="0"/>
+              <a:t> в </a:t>
+            </a:r>
+            <a:r>
+              <a:rPr lang="en-US" b="1" dirty="0">
+                <a:solidFill>
+                  <a:schemeClr val="bg1"/>
+                </a:solidFill>
+              </a:rPr>
+              <a:t>Paint</a:t>
+            </a:r>
+            <a:r>
+              <a:rPr lang="en-US" dirty="0"/>
+              <a:t>, </a:t>
+            </a:r>
+            <a:r>
+              <a:rPr lang="bg-BG" dirty="0"/>
+              <a:t>като използвате </a:t>
+            </a:r>
+            <a:r>
+              <a:rPr lang="bg-BG" b="1" dirty="0"/>
+              <a:t>подходящите инстументи</a:t>
+            </a:r>
+            <a:r>
+              <a:rPr lang="bg-BG" dirty="0"/>
+              <a:t>.</a:t>
+            </a:r>
+            <a:endParaRPr lang="en-US" dirty="0"/>
+          </a:p>
+        </p:txBody>
+      </p:sp>
+      <p:sp>
+        <p:nvSpPr>
+          <p:cNvPr id="4" name="Title 3"/>
+          <p:cNvSpPr>
+            <a:spLocks noGrp="1"/>
+          </p:cNvSpPr>
+          <p:nvPr>
+            <p:ph type="title"/>
+          </p:nvPr>
+        </p:nvSpPr>
+        <p:spPr/>
+        <p:txBody>
+          <a:bodyPr/>
+          <a:lstStyle/>
+          <a:p>
+            <a:r>
+              <a:rPr lang="bg-BG" dirty="0"/>
+              <a:t>Задача: Пътен знак</a:t>
+            </a:r>
+            <a:endParaRPr lang="en-US" dirty="0"/>
+          </a:p>
+        </p:txBody>
+      </p:sp>
+      <p:pic>
+        <p:nvPicPr>
+          <p:cNvPr id="5" name="Picture 4"/>
+          <p:cNvPicPr>
+            <a:picLocks noChangeAspect="1"/>
+          </p:cNvPicPr>
+          <p:nvPr/>
+        </p:nvPicPr>
+        <p:blipFill>
+          <a:blip r:embed="rId2" cstate="hqprint">
+            <a:extLst>
+              <a:ext uri="{28A0092B-C50C-407E-A947-70E740481C1C}">
+                <a14:useLocalDpi xmlns:a14="http://schemas.microsoft.com/office/drawing/2010/main" val="0"/>
+              </a:ext>
+            </a:extLst>
+          </a:blip>
+          <a:stretch>
+            <a:fillRect/>
+          </a:stretch>
+        </p:blipFill>
+        <p:spPr>
+          <a:xfrm>
+            <a:off x="3787500" y="2934000"/>
+            <a:ext cx="4617000" cy="3462750"/>
+          </a:xfrm>
+          <a:prstGeom prst="rect">
+            <a:avLst/>
+          </a:prstGeom>
+        </p:spPr>
+      </p:pic>
+    </p:spTree>
+    <p:extLst>
+      <p:ext uri="{BB962C8B-B14F-4D97-AF65-F5344CB8AC3E}">
+        <p14:creationId xmlns:p14="http://schemas.microsoft.com/office/powerpoint/2010/main" val="1316119170"/>
+      </p:ext>
+    </p:extLst>
+  </p:cSld>
+  <p:clrMapOvr>
+    <a:masterClrMapping/>
+  </p:clrMapOvr>
+  <mc:AlternateContent xmlns:mc="http://schemas.openxmlformats.org/markup-compatibility/2006" xmlns:p14="http://schemas.microsoft.com/office/powerpoint/2010/main">
+    <mc:Choice Requires="p14">
+      <p:transition spd="slow" p14:dur="2000" advClick="0" advTm="5000"/>
+    </mc:Choice>
+    <mc:Fallback xmlns="">
+      <p:transition spd="slow" advClick="0" advTm="5000"/>
+    </mc:Fallback>
+  </mc:AlternateContent>
+</p:sld>
+</file>
+
+<file path=ppt/slides/slide11.xml><?xml version="1.0" encoding="utf-8"?>
+<p:sld xmlns:a="http://schemas.openxmlformats.org/drawingml/2006/main" xmlns:r="http://schemas.openxmlformats.org/officeDocument/2006/relationships" xmlns:p="http://schemas.openxmlformats.org/presentationml/2006/main">
+  <p:cSld>
+    <p:spTree>
+      <p:nvGrpSpPr>
+        <p:cNvPr id="1" name=""/>
+        <p:cNvGrpSpPr/>
+        <p:nvPr/>
+      </p:nvGrpSpPr>
+      <p:grpSpPr>
+        <a:xfrm>
+          <a:off x="0" y="0"/>
+          <a:ext cx="0" cy="0"/>
+          <a:chOff x="0" y="0"/>
+          <a:chExt cx="0" cy="0"/>
+        </a:xfrm>
+      </p:grpSpPr>
+      <p:sp>
+        <p:nvSpPr>
           <p:cNvPr id="3" name="Title 2"/>
           <p:cNvSpPr>
             <a:spLocks noGrp="1"/>
@@ -8121,7 +8337,7 @@
 </p:sld>
 </file>
 
-<file path=ppt/slides/slide11.xml><?xml version="1.0" encoding="utf-8"?>
+<file path=ppt/slides/slide12.xml><?xml version="1.0" encoding="utf-8"?>
 <p:sld xmlns:a="http://schemas.openxmlformats.org/drawingml/2006/main" xmlns:r="http://schemas.openxmlformats.org/officeDocument/2006/relationships" xmlns:p="http://schemas.openxmlformats.org/presentationml/2006/main">
   <p:cSld>
     <p:spTree>
@@ -9850,7 +10066,7 @@
 </p:sld>
 </file>
 
-<file path=ppt/slides/slide12.xml><?xml version="1.0" encoding="utf-8"?>
+<file path=ppt/slides/slide13.xml><?xml version="1.0" encoding="utf-8"?>
 <p:sld xmlns:a="http://schemas.openxmlformats.org/drawingml/2006/main" xmlns:r="http://schemas.openxmlformats.org/officeDocument/2006/relationships" xmlns:p="http://schemas.openxmlformats.org/presentationml/2006/main">
   <p:cSld>
     <p:spTree>
@@ -9885,7 +10101,7 @@
             <a:fld id="{2BF067CD-8E6B-4360-9AA8-C5DF2A48A6D1}" type="slidenum">
               <a:rPr lang="en-US" noProof="0" smtClean="0"/>
               <a:pPr/>
-              <a:t>12</a:t>
+              <a:t>13</a:t>
             </a:fld>
             <a:endParaRPr lang="en-US" noProof="0" dirty="0"/>
           </a:p>
@@ -10039,7 +10255,7 @@
 </p:sld>
 </file>
 
-<file path=ppt/slides/slide13.xml><?xml version="1.0" encoding="utf-8"?>
+<file path=ppt/slides/slide14.xml><?xml version="1.0" encoding="utf-8"?>
 <p:sld xmlns:a="http://schemas.openxmlformats.org/drawingml/2006/main" xmlns:r="http://schemas.openxmlformats.org/officeDocument/2006/relationships" xmlns:p="http://schemas.openxmlformats.org/presentationml/2006/main">
   <p:cSld>
     <p:spTree>
@@ -10074,7 +10290,7 @@
             <a:fld id="{2BF067CD-8E6B-4360-9AA8-C5DF2A48A6D1}" type="slidenum">
               <a:rPr lang="en-US" noProof="0" smtClean="0"/>
               <a:pPr/>
-              <a:t>13</a:t>
+              <a:t>14</a:t>
             </a:fld>
             <a:endParaRPr lang="en-US" noProof="0" dirty="0"/>
           </a:p>
@@ -10200,8 +10416,8 @@
         </p:blipFill>
         <p:spPr>
           <a:xfrm>
-            <a:off x="4701000" y="2664000"/>
-            <a:ext cx="2534004" cy="3781953"/>
+            <a:off x="4701000" y="2529000"/>
+            <a:ext cx="2790000" cy="4164022"/>
           </a:xfrm>
           <a:prstGeom prst="rect">
             <a:avLst/>
@@ -10223,8 +10439,8 @@
         </p:nvSpPr>
         <p:spPr bwMode="auto">
           <a:xfrm>
-            <a:off x="4701000" y="4689000"/>
-            <a:ext cx="2534004" cy="1350000"/>
+            <a:off x="4701000" y="4658634"/>
+            <a:ext cx="2790000" cy="1380366"/>
           </a:xfrm>
           <a:prstGeom prst="rect">
             <a:avLst/>
@@ -10289,13 +10505,13 @@
         </p:nvSpPr>
         <p:spPr bwMode="auto">
           <a:xfrm>
-            <a:off x="7491000" y="2646784"/>
-            <a:ext cx="4181744" cy="2312216"/>
+            <a:off x="7584256" y="2844000"/>
+            <a:ext cx="4181744" cy="2115000"/>
           </a:xfrm>
           <a:prstGeom prst="wedgeRoundRectCallout">
             <a:avLst>
-              <a:gd name="adj1" fmla="val -53228"/>
-              <a:gd name="adj2" fmla="val 75851"/>
+              <a:gd name="adj1" fmla="val -48369"/>
+              <a:gd name="adj2" fmla="val 72555"/>
               <a:gd name="adj3" fmla="val 16667"/>
             </a:avLst>
           </a:prstGeom>
@@ -10434,25 +10650,7 @@
                   </a:outerShdw>
                 </a:effectLst>
               </a:rPr>
-              <a:t>се въвеждат стойности за накланяне на маркирания обект</a:t>
-            </a:r>
-          </a:p>
-          <a:p>
-            <a:pPr algn="ctr"/>
-            <a:r>
-              <a:rPr lang="bg-BG" sz="2800" b="1" dirty="0">
-                <a:solidFill>
-                  <a:srgbClr val="FFFFFF"/>
-                </a:solidFill>
-                <a:effectLst>
-                  <a:outerShdw blurRad="38100" dist="38100" dir="2700000" algn="tl">
-                    <a:srgbClr val="000000">
-                      <a:alpha val="43137"/>
-                    </a:srgbClr>
-                  </a:outerShdw>
-                </a:effectLst>
-              </a:rPr>
-              <a:t>(1 – 89)</a:t>
+              <a:t>се въвеждат стойности за накланяне (1 – 89)</a:t>
             </a:r>
             <a:endParaRPr lang="en-US" sz="2800" b="1" dirty="0">
               <a:solidFill>
@@ -10708,7 +10906,7 @@
 </p:sld>
 </file>
 
-<file path=ppt/slides/slide14.xml><?xml version="1.0" encoding="utf-8"?>
+<file path=ppt/slides/slide15.xml><?xml version="1.0" encoding="utf-8"?>
 <p:sld xmlns:a="http://schemas.openxmlformats.org/drawingml/2006/main" xmlns:r="http://schemas.openxmlformats.org/officeDocument/2006/relationships" xmlns:p="http://schemas.openxmlformats.org/presentationml/2006/main">
   <p:cSld>
     <p:spTree>
@@ -10743,7 +10941,7 @@
             <a:fld id="{2BF067CD-8E6B-4360-9AA8-C5DF2A48A6D1}" type="slidenum">
               <a:rPr lang="en-US" noProof="0" smtClean="0"/>
               <a:pPr/>
-              <a:t>14</a:t>
+              <a:t>15</a:t>
             </a:fld>
             <a:endParaRPr lang="en-US" noProof="0" dirty="0"/>
           </a:p>
@@ -10830,7 +11028,7 @@
 </p:sld>
 </file>
 
-<file path=ppt/slides/slide15.xml><?xml version="1.0" encoding="utf-8"?>
+<file path=ppt/slides/slide16.xml><?xml version="1.0" encoding="utf-8"?>
 <p:sld xmlns:a="http://schemas.openxmlformats.org/drawingml/2006/main" xmlns:r="http://schemas.openxmlformats.org/officeDocument/2006/relationships" xmlns:p="http://schemas.openxmlformats.org/presentationml/2006/main">
   <p:cSld>
     <p:spTree>
@@ -10865,7 +11063,7 @@
             <a:fld id="{2BF067CD-8E6B-4360-9AA8-C5DF2A48A6D1}" type="slidenum">
               <a:rPr lang="en-US" noProof="0" smtClean="0"/>
               <a:pPr/>
-              <a:t>15</a:t>
+              <a:t>16</a:t>
             </a:fld>
             <a:endParaRPr lang="en-US" noProof="0" dirty="0"/>
           </a:p>
@@ -10934,7 +11132,7 @@
             </a:r>
             <a:r>
               <a:rPr lang="bg-BG" dirty="0"/>
-              <a:t> желанат част от вас част, която </a:t>
+              <a:t> желаната от вас част, която </a:t>
             </a:r>
             <a:r>
               <a:rPr lang="bg-BG" b="1" dirty="0"/>
@@ -11167,7 +11365,7 @@
 </p:sld>
 </file>
 
-<file path=ppt/slides/slide16.xml><?xml version="1.0" encoding="utf-8"?>
+<file path=ppt/slides/slide17.xml><?xml version="1.0" encoding="utf-8"?>
 <p:sld xmlns:a="http://schemas.openxmlformats.org/drawingml/2006/main" xmlns:r="http://schemas.openxmlformats.org/officeDocument/2006/relationships" xmlns:p="http://schemas.openxmlformats.org/presentationml/2006/main">
   <p:cSld>
     <p:spTree>
@@ -11202,7 +11400,7 @@
             <a:fld id="{2BF067CD-8E6B-4360-9AA8-C5DF2A48A6D1}" type="slidenum">
               <a:rPr lang="en-US" noProof="0" smtClean="0"/>
               <a:pPr/>
-              <a:t>16</a:t>
+              <a:t>17</a:t>
             </a:fld>
             <a:endParaRPr lang="en-US" noProof="0" dirty="0"/>
           </a:p>
@@ -11353,7 +11551,7 @@
 </p:sld>
 </file>
 
-<file path=ppt/slides/slide17.xml><?xml version="1.0" encoding="utf-8"?>
+<file path=ppt/slides/slide18.xml><?xml version="1.0" encoding="utf-8"?>
 <p:sld xmlns:a="http://schemas.openxmlformats.org/drawingml/2006/main" xmlns:r="http://schemas.openxmlformats.org/officeDocument/2006/relationships" xmlns:p="http://schemas.openxmlformats.org/presentationml/2006/main">
   <p:cSld>
     <p:spTree>
@@ -11449,7 +11647,7 @@
 </p:sld>
 </file>
 
-<file path=ppt/slides/slide18.xml><?xml version="1.0" encoding="utf-8"?>
+<file path=ppt/slides/slide19.xml><?xml version="1.0" encoding="utf-8"?>
 <p:sld xmlns:a="http://schemas.openxmlformats.org/drawingml/2006/main" xmlns:r="http://schemas.openxmlformats.org/officeDocument/2006/relationships" xmlns:p="http://schemas.openxmlformats.org/presentationml/2006/main">
   <p:cSld>
     <p:spTree>
@@ -11535,7 +11733,7 @@
         </p:nvSpPr>
         <p:spPr bwMode="auto">
           <a:xfrm>
-            <a:off x="1866000" y="3204000"/>
+            <a:off x="1596000" y="3204000"/>
             <a:ext cx="3780000" cy="720000"/>
           </a:xfrm>
           <a:prstGeom prst="wedgeRoundRectCallout">
@@ -11640,356 +11838,6 @@
       <p:transition spd="slow" advClick="0" advTm="5000"/>
     </mc:Fallback>
   </mc:AlternateContent>
-  <p:timing>
-    <p:tnLst>
-      <p:par>
-        <p:cTn id="1" dur="indefinite" restart="never" nodeType="tmRoot">
-          <p:childTnLst>
-            <p:seq concurrent="1" nextAc="seek">
-              <p:cTn id="2" dur="indefinite" nodeType="mainSeq">
-                <p:childTnLst>
-                  <p:par>
-                    <p:cTn id="3" fill="hold">
-                      <p:stCondLst>
-                        <p:cond delay="indefinite"/>
-                      </p:stCondLst>
-                      <p:childTnLst>
-                        <p:par>
-                          <p:cTn id="4" fill="hold">
-                            <p:stCondLst>
-                              <p:cond delay="0"/>
-                            </p:stCondLst>
-                            <p:childTnLst>
-                              <p:par>
-                                <p:cTn id="5" presetID="1" presetClass="entr" presetSubtype="0" fill="hold" grpId="0" nodeType="clickEffect">
-                                  <p:stCondLst>
-                                    <p:cond delay="0"/>
-                                  </p:stCondLst>
-                                  <p:childTnLst>
-                                    <p:set>
-                                      <p:cBhvr>
-                                        <p:cTn id="6" dur="1" fill="hold">
-                                          <p:stCondLst>
-                                            <p:cond delay="0"/>
-                                          </p:stCondLst>
-                                        </p:cTn>
-                                        <p:tgtEl>
-                                          <p:spTgt spid="9"/>
-                                        </p:tgtEl>
-                                        <p:attrNameLst>
-                                          <p:attrName>style.visibility</p:attrName>
-                                        </p:attrNameLst>
-                                      </p:cBhvr>
-                                      <p:to>
-                                        <p:strVal val="visible"/>
-                                      </p:to>
-                                    </p:set>
-                                  </p:childTnLst>
-                                </p:cTn>
-                              </p:par>
-                            </p:childTnLst>
-                          </p:cTn>
-                        </p:par>
-                      </p:childTnLst>
-                    </p:cTn>
-                  </p:par>
-                </p:childTnLst>
-              </p:cTn>
-              <p:prevCondLst>
-                <p:cond evt="onPrev" delay="0">
-                  <p:tgtEl>
-                    <p:sldTgt/>
-                  </p:tgtEl>
-                </p:cond>
-              </p:prevCondLst>
-              <p:nextCondLst>
-                <p:cond evt="onNext" delay="0">
-                  <p:tgtEl>
-                    <p:sldTgt/>
-                  </p:tgtEl>
-                </p:cond>
-              </p:nextCondLst>
-            </p:seq>
-          </p:childTnLst>
-        </p:cTn>
-      </p:par>
-    </p:tnLst>
-    <p:bldLst>
-      <p:bldP spid="9" grpId="0" animBg="1"/>
-    </p:bldLst>
-  </p:timing>
-</p:sld>
-</file>
-
-<file path=ppt/slides/slide19.xml><?xml version="1.0" encoding="utf-8"?>
-<p:sld xmlns:a="http://schemas.openxmlformats.org/drawingml/2006/main" xmlns:r="http://schemas.openxmlformats.org/officeDocument/2006/relationships" xmlns:p="http://schemas.openxmlformats.org/presentationml/2006/main">
-  <p:cSld>
-    <p:spTree>
-      <p:nvGrpSpPr>
-        <p:cNvPr id="1" name=""/>
-        <p:cNvGrpSpPr/>
-        <p:nvPr/>
-      </p:nvGrpSpPr>
-      <p:grpSpPr>
-        <a:xfrm>
-          <a:off x="0" y="0"/>
-          <a:ext cx="0" cy="0"/>
-          <a:chOff x="0" y="0"/>
-          <a:chExt cx="0" cy="0"/>
-        </a:xfrm>
-      </p:grpSpPr>
-      <p:pic>
-        <p:nvPicPr>
-          <p:cNvPr id="8" name="Picture 7"/>
-          <p:cNvPicPr>
-            <a:picLocks noChangeAspect="1"/>
-          </p:cNvPicPr>
-          <p:nvPr/>
-        </p:nvPicPr>
-        <p:blipFill rotWithShape="1">
-          <a:blip r:embed="rId2">
-            <a:extLst>
-              <a:ext uri="{28A0092B-C50C-407E-A947-70E740481C1C}">
-                <a14:useLocalDpi xmlns:a14="http://schemas.microsoft.com/office/drawing/2010/main" val="0"/>
-              </a:ext>
-            </a:extLst>
-          </a:blip>
-          <a:srcRect b="4016"/>
-          <a:stretch/>
-        </p:blipFill>
-        <p:spPr>
-          <a:xfrm>
-            <a:off x="1134750" y="1269000"/>
-            <a:ext cx="9922500" cy="5357218"/>
-          </a:xfrm>
-          <a:prstGeom prst="rect">
-            <a:avLst/>
-          </a:prstGeom>
-          <a:ln>
-            <a:solidFill>
-              <a:schemeClr val="bg2">
-                <a:lumMod val="75000"/>
-              </a:schemeClr>
-            </a:solidFill>
-          </a:ln>
-        </p:spPr>
-      </p:pic>
-      <p:sp>
-        <p:nvSpPr>
-          <p:cNvPr id="4" name="Title 3"/>
-          <p:cNvSpPr>
-            <a:spLocks noGrp="1"/>
-          </p:cNvSpPr>
-          <p:nvPr>
-            <p:ph type="title"/>
-          </p:nvPr>
-        </p:nvSpPr>
-        <p:spPr/>
-        <p:txBody>
-          <a:bodyPr>
-            <a:normAutofit/>
-          </a:bodyPr>
-          <a:lstStyle/>
-          <a:p>
-            <a:r>
-              <a:rPr lang="bg-BG" dirty="0"/>
-              <a:t>͏Отпечатване на изображение</a:t>
-            </a:r>
-            <a:endParaRPr lang="en-US" dirty="0"/>
-          </a:p>
-        </p:txBody>
-      </p:sp>
-      <p:sp>
-        <p:nvSpPr>
-          <p:cNvPr id="9" name="Rounded Rectangular Callout 8"/>
-          <p:cNvSpPr/>
-          <p:nvPr/>
-        </p:nvSpPr>
-        <p:spPr bwMode="auto">
-          <a:xfrm>
-            <a:off x="3171000" y="3204000"/>
-            <a:ext cx="2925000" cy="1170000"/>
-          </a:xfrm>
-          <a:prstGeom prst="wedgeRoundRectCallout">
-            <a:avLst>
-              <a:gd name="adj1" fmla="val -89541"/>
-              <a:gd name="adj2" fmla="val -104738"/>
-              <a:gd name="adj3" fmla="val 16667"/>
-            </a:avLst>
-          </a:prstGeom>
-          <a:solidFill>
-            <a:schemeClr val="dk2">
-              <a:alpha val="80000"/>
-            </a:schemeClr>
-          </a:solidFill>
-          <a:ln w="19050">
-            <a:solidFill>
-              <a:schemeClr val="tx1">
-                <a:lumMod val="75000"/>
-                <a:alpha val="80000"/>
-              </a:schemeClr>
-            </a:solidFill>
-          </a:ln>
-          <a:effectLst/>
-        </p:spPr>
-        <p:style>
-          <a:lnRef idx="2">
-            <a:schemeClr val="accent1">
-              <a:shade val="50000"/>
-            </a:schemeClr>
-          </a:lnRef>
-          <a:fillRef idx="1001">
-            <a:schemeClr val="dk2"/>
-          </a:fillRef>
-          <a:effectRef idx="0">
-            <a:schemeClr val="accent1"/>
-          </a:effectRef>
-          <a:fontRef idx="minor">
-            <a:schemeClr val="lt1"/>
-          </a:fontRef>
-        </p:style>
-        <p:txBody>
-          <a:bodyPr rot="0" spcFirstLastPara="0" vertOverflow="overflow" horzOverflow="overflow" vert="horz" wrap="square" lIns="91440" tIns="45720" rIns="91440" bIns="45720" numCol="1" spcCol="0" rtlCol="0" fromWordArt="0" anchor="ctr" anchorCtr="0" forceAA="0" compatLnSpc="1">
-            <a:prstTxWarp prst="textNoShape">
-              <a:avLst/>
-            </a:prstTxWarp>
-            <a:noAutofit/>
-          </a:bodyPr>
-          <a:lstStyle/>
-          <a:p>
-            <a:pPr algn="ctr"/>
-            <a:r>
-              <a:rPr lang="bg-BG" sz="2800" b="1" dirty="0">
-                <a:solidFill>
-                  <a:srgbClr val="FFFFFF"/>
-                </a:solidFill>
-                <a:effectLst>
-                  <a:outerShdw blurRad="38100" dist="38100" dir="2700000" algn="tl">
-                    <a:srgbClr val="000000">
-                      <a:alpha val="43137"/>
-                    </a:srgbClr>
-                  </a:outerShdw>
-                </a:effectLst>
-              </a:rPr>
-              <a:t>Избираме командата </a:t>
-            </a:r>
-            <a:r>
-              <a:rPr lang="en-US" sz="2800" b="1" dirty="0">
-                <a:solidFill>
-                  <a:schemeClr val="accent1">
-                    <a:lumMod val="60000"/>
-                    <a:lumOff val="40000"/>
-                  </a:schemeClr>
-                </a:solidFill>
-                <a:effectLst>
-                  <a:outerShdw blurRad="38100" dist="38100" dir="2700000" algn="tl">
-                    <a:srgbClr val="000000">
-                      <a:alpha val="43137"/>
-                    </a:srgbClr>
-                  </a:outerShdw>
-                </a:effectLst>
-              </a:rPr>
-              <a:t>Print</a:t>
-            </a:r>
-          </a:p>
-        </p:txBody>
-      </p:sp>
-    </p:spTree>
-    <p:extLst>
-      <p:ext uri="{BB962C8B-B14F-4D97-AF65-F5344CB8AC3E}">
-        <p14:creationId xmlns:p14="http://schemas.microsoft.com/office/powerpoint/2010/main" val="206616892"/>
-      </p:ext>
-    </p:extLst>
-  </p:cSld>
-  <p:clrMapOvr>
-    <a:masterClrMapping/>
-  </p:clrMapOvr>
-  <mc:AlternateContent xmlns:mc="http://schemas.openxmlformats.org/markup-compatibility/2006" xmlns:p14="http://schemas.microsoft.com/office/powerpoint/2010/main">
-    <mc:Choice Requires="p14">
-      <p:transition spd="slow" p14:dur="2000" advClick="0" advTm="5000"/>
-    </mc:Choice>
-    <mc:Fallback xmlns="">
-      <p:transition spd="slow" advClick="0" advTm="5000"/>
-    </mc:Fallback>
-  </mc:AlternateContent>
-  <p:timing>
-    <p:tnLst>
-      <p:par>
-        <p:cTn id="1" dur="indefinite" restart="never" nodeType="tmRoot">
-          <p:childTnLst>
-            <p:seq concurrent="1" nextAc="seek">
-              <p:cTn id="2" dur="indefinite" nodeType="mainSeq">
-                <p:childTnLst>
-                  <p:par>
-                    <p:cTn id="3" fill="hold">
-                      <p:stCondLst>
-                        <p:cond delay="indefinite"/>
-                      </p:stCondLst>
-                      <p:childTnLst>
-                        <p:par>
-                          <p:cTn id="4" fill="hold">
-                            <p:stCondLst>
-                              <p:cond delay="0"/>
-                            </p:stCondLst>
-                            <p:childTnLst>
-                              <p:par>
-                                <p:cTn id="5" presetID="1" presetClass="entr" presetSubtype="0" fill="hold" grpId="0" nodeType="clickEffect">
-                                  <p:stCondLst>
-                                    <p:cond delay="0"/>
-                                  </p:stCondLst>
-                                  <p:childTnLst>
-                                    <p:set>
-                                      <p:cBhvr>
-                                        <p:cTn id="6" dur="1" fill="hold">
-                                          <p:stCondLst>
-                                            <p:cond delay="0"/>
-                                          </p:stCondLst>
-                                        </p:cTn>
-                                        <p:tgtEl>
-                                          <p:spTgt spid="9"/>
-                                        </p:tgtEl>
-                                        <p:attrNameLst>
-                                          <p:attrName>style.visibility</p:attrName>
-                                        </p:attrNameLst>
-                                      </p:cBhvr>
-                                      <p:to>
-                                        <p:strVal val="visible"/>
-                                      </p:to>
-                                    </p:set>
-                                  </p:childTnLst>
-                                </p:cTn>
-                              </p:par>
-                            </p:childTnLst>
-                          </p:cTn>
-                        </p:par>
-                      </p:childTnLst>
-                    </p:cTn>
-                  </p:par>
-                </p:childTnLst>
-              </p:cTn>
-              <p:prevCondLst>
-                <p:cond evt="onPrev" delay="0">
-                  <p:tgtEl>
-                    <p:sldTgt/>
-                  </p:tgtEl>
-                </p:cond>
-              </p:prevCondLst>
-              <p:nextCondLst>
-                <p:cond evt="onNext" delay="0">
-                  <p:tgtEl>
-                    <p:sldTgt/>
-                  </p:tgtEl>
-                </p:cond>
-              </p:nextCondLst>
-            </p:seq>
-          </p:childTnLst>
-        </p:cTn>
-      </p:par>
-    </p:tnLst>
-    <p:bldLst>
-      <p:bldP spid="9" grpId="0" animBg="1"/>
-    </p:bldLst>
-  </p:timing>
 </p:sld>
 </file>
 
@@ -12194,7 +12042,7 @@
               <a:t> и </a:t>
             </a:r>
             <a:r>
-              <a:rPr lang="bg-BG" b="1" dirty="0" smtClean="0"/>
+              <a:rPr lang="bg-BG" b="1" dirty="0"/>
               <a:t>обръщане</a:t>
             </a:r>
             <a:endParaRPr lang="bg-BG" dirty="0"/>
@@ -12202,7 +12050,7 @@
           <a:p>
             <a:pPr lvl="1"/>
             <a:r>
-              <a:rPr lang="bg-BG" b="1" dirty="0" smtClean="0"/>
+              <a:rPr lang="bg-BG" b="1" dirty="0"/>
               <a:t>Наклоняване</a:t>
             </a:r>
             <a:endParaRPr lang="bg-BG" dirty="0"/>
@@ -12210,7 +12058,7 @@
           <a:p>
             <a:pPr lvl="1"/>
             <a:r>
-              <a:rPr lang="bg-BG" b="1" smtClean="0"/>
+              <a:rPr lang="bg-BG" b="1"/>
               <a:t>Изрязване</a:t>
             </a:r>
             <a:endParaRPr lang="bg-BG" dirty="0"/>
@@ -12642,8 +12490,8 @@
         </p:blipFill>
         <p:spPr>
           <a:xfrm>
-            <a:off x="1135617" y="1269000"/>
-            <a:ext cx="9922498" cy="5357218"/>
+            <a:off x="1134750" y="1269000"/>
+            <a:ext cx="9922500" cy="5357218"/>
           </a:xfrm>
           <a:prstGeom prst="rect">
             <a:avLst/>
@@ -12690,13 +12538,13 @@
         </p:nvSpPr>
         <p:spPr bwMode="auto">
           <a:xfrm>
-            <a:off x="5106000" y="3159000"/>
-            <a:ext cx="3389297" cy="1125000"/>
+            <a:off x="3171000" y="3204000"/>
+            <a:ext cx="2925000" cy="1170000"/>
           </a:xfrm>
           <a:prstGeom prst="wedgeRoundRectCallout">
             <a:avLst>
-              <a:gd name="adj1" fmla="val -85698"/>
-              <a:gd name="adj2" fmla="val -124241"/>
+              <a:gd name="adj1" fmla="val -89541"/>
+              <a:gd name="adj2" fmla="val -104738"/>
               <a:gd name="adj3" fmla="val 16667"/>
             </a:avLst>
           </a:prstGeom>
@@ -12754,30 +12602,33 @@
                   </a:outerShdw>
                 </a:effectLst>
               </a:rPr>
-              <a:t>Така се появяват три възможности</a:t>
-            </a:r>
-            <a:endParaRPr lang="en-US" sz="2800" b="1" dirty="0">
-              <a:solidFill>
-                <a:schemeClr val="accent1">
-                  <a:lumMod val="60000"/>
-                  <a:lumOff val="40000"/>
-                </a:schemeClr>
-              </a:solidFill>
-              <a:effectLst>
-                <a:outerShdw blurRad="38100" dist="38100" dir="2700000" algn="tl">
-                  <a:srgbClr val="000000">
-                    <a:alpha val="43137"/>
-                  </a:srgbClr>
-                </a:outerShdw>
-              </a:effectLst>
-            </a:endParaRPr>
+              <a:t>Избираме командата </a:t>
+            </a:r>
+            <a:r>
+              <a:rPr lang="en-US" sz="2800" b="1" dirty="0">
+                <a:solidFill>
+                  <a:schemeClr val="accent1">
+                    <a:lumMod val="60000"/>
+                    <a:lumOff val="40000"/>
+                  </a:schemeClr>
+                </a:solidFill>
+                <a:effectLst>
+                  <a:outerShdw blurRad="38100" dist="38100" dir="2700000" algn="tl">
+                    <a:srgbClr val="000000">
+                      <a:alpha val="43137"/>
+                    </a:srgbClr>
+                  </a:outerShdw>
+                </a:effectLst>
+              </a:rPr>
+              <a:t>Print</a:t>
+            </a:r>
           </a:p>
         </p:txBody>
       </p:sp>
     </p:spTree>
     <p:extLst>
       <p:ext uri="{BB962C8B-B14F-4D97-AF65-F5344CB8AC3E}">
-        <p14:creationId xmlns:p14="http://schemas.microsoft.com/office/powerpoint/2010/main" val="4091886726"/>
+        <p14:creationId xmlns:p14="http://schemas.microsoft.com/office/powerpoint/2010/main" val="206616892"/>
       </p:ext>
     </p:extLst>
   </p:cSld>
@@ -12892,7 +12743,7 @@
       </p:grpSpPr>
       <p:pic>
         <p:nvPicPr>
-          <p:cNvPr id="7" name="Picture 6"/>
+          <p:cNvPr id="8" name="Picture 7"/>
           <p:cNvPicPr>
             <a:picLocks noChangeAspect="1"/>
           </p:cNvPicPr>
@@ -12944,9 +12795,10 @@
           <a:lstStyle/>
           <a:p>
             <a:r>
-              <a:rPr lang="en-US" dirty="0"/>
-              <a:t>Print Preview</a:t>
-            </a:r>
+              <a:rPr lang="bg-BG" dirty="0"/>
+              <a:t>͏Отпечатване на изображение</a:t>
+            </a:r>
+            <a:endParaRPr lang="en-US" dirty="0"/>
           </a:p>
         </p:txBody>
       </p:sp>
@@ -12958,13 +12810,13 @@
         </p:nvSpPr>
         <p:spPr bwMode="auto">
           <a:xfrm>
-            <a:off x="696000" y="4644000"/>
-            <a:ext cx="4379298" cy="1530000"/>
+            <a:off x="5106000" y="3159000"/>
+            <a:ext cx="3389297" cy="1125000"/>
           </a:xfrm>
           <a:prstGeom prst="wedgeRoundRectCallout">
             <a:avLst>
-              <a:gd name="adj1" fmla="val -40394"/>
-              <a:gd name="adj2" fmla="val -34660"/>
+              <a:gd name="adj1" fmla="val -85698"/>
+              <a:gd name="adj2" fmla="val -124241"/>
               <a:gd name="adj3" fmla="val 16667"/>
             </a:avLst>
           </a:prstGeom>
@@ -13022,7 +12874,7 @@
                   </a:outerShdw>
                 </a:effectLst>
               </a:rPr>
-              <a:t>Виждате как ще изглежда отпечатаното изображение</a:t>
+              <a:t>Така се появяват три възможности</a:t>
             </a:r>
             <a:endParaRPr lang="en-US" sz="2800" b="1" dirty="0">
               <a:solidFill>
@@ -13045,7 +12897,7 @@
     </p:spTree>
     <p:extLst>
       <p:ext uri="{BB962C8B-B14F-4D97-AF65-F5344CB8AC3E}">
-        <p14:creationId xmlns:p14="http://schemas.microsoft.com/office/powerpoint/2010/main" val="3025276678"/>
+        <p14:creationId xmlns:p14="http://schemas.microsoft.com/office/powerpoint/2010/main" val="4091886726"/>
       </p:ext>
     </p:extLst>
   </p:cSld>
@@ -13158,6 +13010,226 @@
           <a:chExt cx="0" cy="0"/>
         </a:xfrm>
       </p:grpSpPr>
+      <p:pic>
+        <p:nvPicPr>
+          <p:cNvPr id="7" name="Picture 6"/>
+          <p:cNvPicPr>
+            <a:picLocks noChangeAspect="1"/>
+          </p:cNvPicPr>
+          <p:nvPr/>
+        </p:nvPicPr>
+        <p:blipFill rotWithShape="1">
+          <a:blip r:embed="rId2">
+            <a:extLst>
+              <a:ext uri="{28A0092B-C50C-407E-A947-70E740481C1C}">
+                <a14:useLocalDpi xmlns:a14="http://schemas.microsoft.com/office/drawing/2010/main" val="0"/>
+              </a:ext>
+            </a:extLst>
+          </a:blip>
+          <a:srcRect b="4016"/>
+          <a:stretch/>
+        </p:blipFill>
+        <p:spPr>
+          <a:xfrm>
+            <a:off x="1135617" y="1269000"/>
+            <a:ext cx="9922498" cy="5357218"/>
+          </a:xfrm>
+          <a:prstGeom prst="rect">
+            <a:avLst/>
+          </a:prstGeom>
+          <a:ln>
+            <a:solidFill>
+              <a:schemeClr val="bg2">
+                <a:lumMod val="75000"/>
+              </a:schemeClr>
+            </a:solidFill>
+          </a:ln>
+        </p:spPr>
+      </p:pic>
+      <p:sp>
+        <p:nvSpPr>
+          <p:cNvPr id="4" name="Title 3"/>
+          <p:cNvSpPr>
+            <a:spLocks noGrp="1"/>
+          </p:cNvSpPr>
+          <p:nvPr>
+            <p:ph type="title"/>
+          </p:nvPr>
+        </p:nvSpPr>
+        <p:spPr/>
+        <p:txBody>
+          <a:bodyPr>
+            <a:normAutofit/>
+          </a:bodyPr>
+          <a:lstStyle/>
+          <a:p>
+            <a:r>
+              <a:rPr lang="en-US" dirty="0"/>
+              <a:t>Print Preview</a:t>
+            </a:r>
+          </a:p>
+        </p:txBody>
+      </p:sp>
+      <p:sp>
+        <p:nvSpPr>
+          <p:cNvPr id="9" name="Rounded Rectangular Callout 8"/>
+          <p:cNvSpPr/>
+          <p:nvPr/>
+        </p:nvSpPr>
+        <p:spPr bwMode="auto">
+          <a:xfrm>
+            <a:off x="476767" y="4689000"/>
+            <a:ext cx="4860000" cy="1530000"/>
+          </a:xfrm>
+          <a:prstGeom prst="wedgeRoundRectCallout">
+            <a:avLst>
+              <a:gd name="adj1" fmla="val -40394"/>
+              <a:gd name="adj2" fmla="val -34660"/>
+              <a:gd name="adj3" fmla="val 16667"/>
+            </a:avLst>
+          </a:prstGeom>
+          <a:solidFill>
+            <a:schemeClr val="dk2">
+              <a:alpha val="80000"/>
+            </a:schemeClr>
+          </a:solidFill>
+          <a:ln w="19050">
+            <a:solidFill>
+              <a:schemeClr val="tx1">
+                <a:lumMod val="75000"/>
+                <a:alpha val="80000"/>
+              </a:schemeClr>
+            </a:solidFill>
+          </a:ln>
+          <a:effectLst/>
+        </p:spPr>
+        <p:style>
+          <a:lnRef idx="2">
+            <a:schemeClr val="accent1">
+              <a:shade val="50000"/>
+            </a:schemeClr>
+          </a:lnRef>
+          <a:fillRef idx="1001">
+            <a:schemeClr val="dk2"/>
+          </a:fillRef>
+          <a:effectRef idx="0">
+            <a:schemeClr val="accent1"/>
+          </a:effectRef>
+          <a:fontRef idx="minor">
+            <a:schemeClr val="lt1"/>
+          </a:fontRef>
+        </p:style>
+        <p:txBody>
+          <a:bodyPr rot="0" spcFirstLastPara="0" vertOverflow="overflow" horzOverflow="overflow" vert="horz" wrap="square" lIns="91440" tIns="45720" rIns="91440" bIns="45720" numCol="1" spcCol="0" rtlCol="0" fromWordArt="0" anchor="ctr" anchorCtr="0" forceAA="0" compatLnSpc="1">
+            <a:prstTxWarp prst="textNoShape">
+              <a:avLst/>
+            </a:prstTxWarp>
+            <a:noAutofit/>
+          </a:bodyPr>
+          <a:lstStyle/>
+          <a:p>
+            <a:pPr algn="ctr"/>
+            <a:r>
+              <a:rPr lang="bg-BG" sz="2800" b="1" dirty="0">
+                <a:solidFill>
+                  <a:srgbClr val="FFFFFF"/>
+                </a:solidFill>
+                <a:effectLst>
+                  <a:outerShdw blurRad="38100" dist="38100" dir="2700000" algn="tl">
+                    <a:srgbClr val="000000">
+                      <a:alpha val="43137"/>
+                    </a:srgbClr>
+                  </a:outerShdw>
+                </a:effectLst>
+              </a:rPr>
+              <a:t>С </a:t>
+            </a:r>
+            <a:r>
+              <a:rPr lang="en-US" sz="2800" b="1" dirty="0">
+                <a:solidFill>
+                  <a:srgbClr val="FFFFFF"/>
+                </a:solidFill>
+                <a:effectLst>
+                  <a:outerShdw blurRad="38100" dist="38100" dir="2700000" algn="tl">
+                    <a:srgbClr val="000000">
+                      <a:alpha val="43137"/>
+                    </a:srgbClr>
+                  </a:outerShdw>
+                </a:effectLst>
+              </a:rPr>
+              <a:t>Print Preview </a:t>
+            </a:r>
+            <a:r>
+              <a:rPr lang="bg-BG" sz="2800" b="1" dirty="0">
+                <a:solidFill>
+                  <a:srgbClr val="FFFFFF"/>
+                </a:solidFill>
+                <a:effectLst>
+                  <a:outerShdw blurRad="38100" dist="38100" dir="2700000" algn="tl">
+                    <a:srgbClr val="000000">
+                      <a:alpha val="43137"/>
+                    </a:srgbClr>
+                  </a:outerShdw>
+                </a:effectLst>
+              </a:rPr>
+              <a:t>виждате как ще изглежда отпечатаното изображение</a:t>
+            </a:r>
+            <a:endParaRPr lang="en-US" sz="2800" b="1" dirty="0">
+              <a:solidFill>
+                <a:schemeClr val="accent1">
+                  <a:lumMod val="60000"/>
+                  <a:lumOff val="40000"/>
+                </a:schemeClr>
+              </a:solidFill>
+              <a:effectLst>
+                <a:outerShdw blurRad="38100" dist="38100" dir="2700000" algn="tl">
+                  <a:srgbClr val="000000">
+                    <a:alpha val="43137"/>
+                  </a:srgbClr>
+                </a:outerShdw>
+              </a:effectLst>
+            </a:endParaRPr>
+          </a:p>
+        </p:txBody>
+      </p:sp>
+    </p:spTree>
+    <p:extLst>
+      <p:ext uri="{BB962C8B-B14F-4D97-AF65-F5344CB8AC3E}">
+        <p14:creationId xmlns:p14="http://schemas.microsoft.com/office/powerpoint/2010/main" val="3025276678"/>
+      </p:ext>
+    </p:extLst>
+  </p:cSld>
+  <p:clrMapOvr>
+    <a:masterClrMapping/>
+  </p:clrMapOvr>
+  <mc:AlternateContent xmlns:mc="http://schemas.openxmlformats.org/markup-compatibility/2006" xmlns:p14="http://schemas.microsoft.com/office/powerpoint/2010/main">
+    <mc:Choice Requires="p14">
+      <p:transition spd="slow" p14:dur="2000" advClick="0" advTm="5000"/>
+    </mc:Choice>
+    <mc:Fallback xmlns="">
+      <p:transition spd="slow" advClick="0" advTm="5000"/>
+    </mc:Fallback>
+  </mc:AlternateContent>
+</p:sld>
+</file>
+
+<file path=ppt/slides/slide23.xml><?xml version="1.0" encoding="utf-8"?>
+<p:sld xmlns:a="http://schemas.openxmlformats.org/drawingml/2006/main" xmlns:r="http://schemas.openxmlformats.org/officeDocument/2006/relationships" xmlns:p="http://schemas.openxmlformats.org/presentationml/2006/main">
+  <p:cSld>
+    <p:spTree>
+      <p:nvGrpSpPr>
+        <p:cNvPr id="1" name=""/>
+        <p:cNvGrpSpPr/>
+        <p:nvPr/>
+      </p:nvGrpSpPr>
+      <p:grpSpPr>
+        <a:xfrm>
+          <a:off x="0" y="0"/>
+          <a:ext cx="0" cy="0"/>
+          <a:chOff x="0" y="0"/>
+          <a:chExt cx="0" cy="0"/>
+        </a:xfrm>
+      </p:grpSpPr>
       <p:sp>
         <p:nvSpPr>
           <p:cNvPr id="2" name="Slide Number Placeholder 1"/>
@@ -13176,7 +13248,7 @@
             <a:fld id="{2BF067CD-8E6B-4360-9AA8-C5DF2A48A6D1}" type="slidenum">
               <a:rPr lang="en-US" noProof="0" smtClean="0"/>
               <a:pPr/>
-              <a:t>22</a:t>
+              <a:t>23</a:t>
             </a:fld>
             <a:endParaRPr lang="en-US" noProof="0" dirty="0"/>
           </a:p>
@@ -13198,8 +13270,20 @@
           <a:lstStyle/>
           <a:p>
             <a:r>
+              <a:rPr lang="bg-BG" dirty="0"/>
+              <a:t>От </a:t>
+            </a:r>
+            <a:r>
+              <a:rPr lang="en-US" b="1" dirty="0">
+                <a:solidFill>
+                  <a:schemeClr val="bg1"/>
+                </a:solidFill>
+              </a:rPr>
+              <a:t>Page Setup </a:t>
+            </a:r>
+            <a:r>
               <a:rPr lang="ru-RU" dirty="0"/>
-              <a:t>Отваря се диалогов прозорец, откъдето се </a:t>
+              <a:t>се отваря диалогов прозорец, откъдето се </a:t>
             </a:r>
             <a:r>
               <a:rPr lang="ru-RU" b="1" dirty="0"/>
@@ -14123,7 +14207,7 @@
 </p:sld>
 </file>
 
-<file path=ppt/slides/slide23.xml><?xml version="1.0" encoding="utf-8"?>
+<file path=ppt/slides/slide24.xml><?xml version="1.0" encoding="utf-8"?>
 <p:sld xmlns:a="http://schemas.openxmlformats.org/drawingml/2006/main" xmlns:r="http://schemas.openxmlformats.org/officeDocument/2006/relationships" xmlns:p="http://schemas.openxmlformats.org/presentationml/2006/main">
   <p:cSld>
     <p:spTree>
@@ -14158,7 +14242,7 @@
             <a:fld id="{2BF067CD-8E6B-4360-9AA8-C5DF2A48A6D1}" type="slidenum">
               <a:rPr lang="en-US" noProof="0" smtClean="0"/>
               <a:pPr/>
-              <a:t>23</a:t>
+              <a:t>24</a:t>
             </a:fld>
             <a:endParaRPr lang="en-US" noProof="0" dirty="0"/>
           </a:p>
@@ -14181,7 +14265,23 @@
           <a:p>
             <a:r>
               <a:rPr lang="bg-BG" dirty="0"/>
-              <a:t>Отваря се диалогов прозорец, откъдето се избира:</a:t>
+              <a:t>От </a:t>
+            </a:r>
+            <a:r>
+              <a:rPr lang="en-US" b="1" dirty="0">
+                <a:solidFill>
+                  <a:schemeClr val="bg1"/>
+                </a:solidFill>
+              </a:rPr>
+              <a:t>Print</a:t>
+            </a:r>
+            <a:r>
+              <a:rPr lang="en-US" dirty="0"/>
+              <a:t> </a:t>
+            </a:r>
+            <a:r>
+              <a:rPr lang="bg-BG" dirty="0"/>
+              <a:t>се отваря диалогов прозорец, откъдето се избира:</a:t>
             </a:r>
           </a:p>
           <a:p>
@@ -14553,7 +14653,7 @@
 </p:sld>
 </file>
 
-<file path=ppt/slides/slide24.xml><?xml version="1.0" encoding="utf-8"?>
+<file path=ppt/slides/slide25.xml><?xml version="1.0" encoding="utf-8"?>
 <p:sld xmlns:a="http://schemas.openxmlformats.org/drawingml/2006/main" xmlns:r="http://schemas.openxmlformats.org/officeDocument/2006/relationships" xmlns:p="http://schemas.openxmlformats.org/presentationml/2006/main">
   <p:cSld>
     <p:spTree>
@@ -14815,7 +14915,7 @@
             <a:fld id="{C014DD1E-5D91-48A3-AD6D-45FBA980D106}" type="slidenum">
               <a:rPr lang="en-US" smtClean="0"/>
               <a:pPr/>
-              <a:t>24</a:t>
+              <a:t>25</a:t>
             </a:fld>
             <a:endParaRPr lang="en-US" dirty="0"/>
           </a:p>
@@ -15865,7 +15965,7 @@
 </p:sld>
 </file>
 
-<file path=ppt/slides/slide25.xml><?xml version="1.0" encoding="utf-8"?>
+<file path=ppt/slides/slide26.xml><?xml version="1.0" encoding="utf-8"?>
 <p:sld xmlns:a="http://schemas.openxmlformats.org/drawingml/2006/main" xmlns:r="http://schemas.openxmlformats.org/officeDocument/2006/relationships" xmlns:p="http://schemas.openxmlformats.org/presentationml/2006/main">
   <p:cSld>
     <p:spTree>
@@ -15979,7 +16079,7 @@
                 <a:hlinkClick r:id="rId3">
                   <a:extLst>
                     <a:ext uri="{A12FA001-AC4F-418D-AE19-62706E023703}">
-                      <ahyp:hlinkClr xmlns="" xmlns:ahyp="http://schemas.microsoft.com/office/drawing/2018/hyperlinkcolor" val="tx"/>
+                      <ahyp:hlinkClr xmlns:ahyp="http://schemas.microsoft.com/office/drawing/2018/hyperlinkcolor" val="tx"/>
                     </a:ext>
                   </a:extLst>
                 </a:hlinkClick>
@@ -16055,7 +16155,7 @@
 </p:sld>
 </file>
 
-<file path=ppt/slides/slide26.xml><?xml version="1.0" encoding="utf-8"?>
+<file path=ppt/slides/slide27.xml><?xml version="1.0" encoding="utf-8"?>
 <p:sld xmlns:a="http://schemas.openxmlformats.org/drawingml/2006/main" xmlns:r="http://schemas.openxmlformats.org/officeDocument/2006/relationships" xmlns:p="http://schemas.openxmlformats.org/presentationml/2006/main">
   <p:cSld>
     <p:spTree>
@@ -16108,7 +16208,7 @@
             <a:fld id="{2BF067CD-8E6B-4360-9AA8-C5DF2A48A6D1}" type="slidenum">
               <a:rPr lang="en-US" smtClean="0"/>
               <a:pPr/>
-              <a:t>26</a:t>
+              <a:t>27</a:t>
             </a:fld>
             <a:endParaRPr lang="en-US" dirty="0"/>
           </a:p>
@@ -16623,8 +16723,8 @@
         </p:nvSpPr>
         <p:spPr>
           <a:xfrm>
-            <a:off x="21000" y="1196125"/>
-            <a:ext cx="12195000" cy="5528766"/>
+            <a:off x="313500" y="1206757"/>
+            <a:ext cx="11565000" cy="5528766"/>
           </a:xfrm>
         </p:spPr>
         <p:txBody>
@@ -16736,28 +16836,28 @@
       </p:sp>
       <p:pic>
         <p:nvPicPr>
-          <p:cNvPr id="6" name="Picture 5"/>
+          <p:cNvPr id="3" name="Picture 2">
+            <a:extLst>
+              <a:ext uri="{FF2B5EF4-FFF2-40B4-BE49-F238E27FC236}">
+                <a16:creationId xmlns:a16="http://schemas.microsoft.com/office/drawing/2014/main" id="{92E91667-8B72-F566-7808-C56CFDA901C6}"/>
+              </a:ext>
+            </a:extLst>
+          </p:cNvPr>
           <p:cNvPicPr>
             <a:picLocks noChangeAspect="1"/>
           </p:cNvPicPr>
           <p:nvPr/>
         </p:nvPicPr>
         <p:blipFill>
-          <a:blip r:embed="rId2">
-            <a:extLst>
-              <a:ext uri="{28A0092B-C50C-407E-A947-70E740481C1C}">
-                <a14:useLocalDpi xmlns:a14="http://schemas.microsoft.com/office/drawing/2010/main" val="0"/>
-              </a:ext>
-            </a:extLst>
-          </a:blip>
+          <a:blip r:embed="rId2"/>
           <a:stretch>
             <a:fillRect/>
           </a:stretch>
         </p:blipFill>
         <p:spPr>
           <a:xfrm>
-            <a:off x="2901000" y="3707313"/>
-            <a:ext cx="5715000" cy="3090598"/>
+            <a:off x="5169900" y="4467725"/>
+            <a:ext cx="1852200" cy="2289525"/>
           </a:xfrm>
           <a:prstGeom prst="rect">
             <a:avLst/>
@@ -16771,6 +16871,78 @@
           </a:ln>
         </p:spPr>
       </p:pic>
+      <p:sp>
+        <p:nvSpPr>
+          <p:cNvPr id="7" name="Rectangle 6">
+            <a:extLst>
+              <a:ext uri="{FF2B5EF4-FFF2-40B4-BE49-F238E27FC236}">
+                <a16:creationId xmlns:a16="http://schemas.microsoft.com/office/drawing/2014/main" id="{E1A3D8EF-F044-9251-CBF4-FB0284B7499E}"/>
+              </a:ext>
+            </a:extLst>
+          </p:cNvPr>
+          <p:cNvSpPr/>
+          <p:nvPr/>
+        </p:nvSpPr>
+        <p:spPr bwMode="auto">
+          <a:xfrm>
+            <a:off x="6339900" y="4695245"/>
+            <a:ext cx="495000" cy="585000"/>
+          </a:xfrm>
+          <a:prstGeom prst="rect">
+            <a:avLst/>
+          </a:prstGeom>
+          <a:noFill/>
+          <a:ln w="57150">
+            <a:solidFill>
+              <a:schemeClr val="tx1">
+                <a:lumMod val="50000"/>
+                <a:alpha val="80000"/>
+              </a:schemeClr>
+            </a:solidFill>
+          </a:ln>
+          <a:effectLst/>
+        </p:spPr>
+        <p:style>
+          <a:lnRef idx="2">
+            <a:schemeClr val="accent1">
+              <a:shade val="50000"/>
+            </a:schemeClr>
+          </a:lnRef>
+          <a:fillRef idx="1001">
+            <a:schemeClr val="dk2"/>
+          </a:fillRef>
+          <a:effectRef idx="0">
+            <a:schemeClr val="accent1"/>
+          </a:effectRef>
+          <a:fontRef idx="minor">
+            <a:schemeClr val="lt1"/>
+          </a:fontRef>
+        </p:style>
+        <p:txBody>
+          <a:bodyPr rot="0" spcFirstLastPara="0" vertOverflow="overflow" horzOverflow="overflow" vert="horz" wrap="square" lIns="91440" tIns="45720" rIns="91440" bIns="45720" numCol="1" spcCol="0" rtlCol="0" fromWordArt="0" anchor="ctr" anchorCtr="0" forceAA="0" compatLnSpc="1">
+            <a:prstTxWarp prst="textNoShape">
+              <a:avLst/>
+            </a:prstTxWarp>
+            <a:noAutofit/>
+          </a:bodyPr>
+          <a:lstStyle/>
+          <a:p>
+            <a:pPr algn="ctr"/>
+            <a:endParaRPr lang="bg-BG" sz="2800" b="1" dirty="0">
+              <a:solidFill>
+                <a:srgbClr val="FFFFFF"/>
+              </a:solidFill>
+              <a:effectLst>
+                <a:outerShdw blurRad="38100" dist="38100" dir="2700000" algn="tl">
+                  <a:srgbClr val="000000">
+                    <a:alpha val="43137"/>
+                  </a:srgbClr>
+                </a:outerShdw>
+              </a:effectLst>
+            </a:endParaRPr>
+          </a:p>
+        </p:txBody>
+      </p:sp>
     </p:spTree>
     <p:extLst>
       <p:ext uri="{BB962C8B-B14F-4D97-AF65-F5344CB8AC3E}">
@@ -16823,6 +16995,78 @@
                                           </p:stCondLst>
                                         </p:cTn>
                                         <p:tgtEl>
+                                          <p:spTgt spid="3"/>
+                                        </p:tgtEl>
+                                        <p:attrNameLst>
+                                          <p:attrName>style.visibility</p:attrName>
+                                        </p:attrNameLst>
+                                      </p:cBhvr>
+                                      <p:to>
+                                        <p:strVal val="visible"/>
+                                      </p:to>
+                                    </p:set>
+                                  </p:childTnLst>
+                                </p:cTn>
+                              </p:par>
+                              <p:par>
+                                <p:cTn id="7" presetID="1" presetClass="entr" presetSubtype="0" fill="hold" grpId="0" nodeType="withEffect">
+                                  <p:stCondLst>
+                                    <p:cond delay="0"/>
+                                  </p:stCondLst>
+                                  <p:childTnLst>
+                                    <p:set>
+                                      <p:cBhvr>
+                                        <p:cTn id="8" dur="1" fill="hold">
+                                          <p:stCondLst>
+                                            <p:cond delay="0"/>
+                                          </p:stCondLst>
+                                        </p:cTn>
+                                        <p:tgtEl>
+                                          <p:spTgt spid="7"/>
+                                        </p:tgtEl>
+                                        <p:attrNameLst>
+                                          <p:attrName>style.visibility</p:attrName>
+                                        </p:attrNameLst>
+                                      </p:cBhvr>
+                                      <p:to>
+                                        <p:strVal val="visible"/>
+                                      </p:to>
+                                    </p:set>
+                                  </p:childTnLst>
+                                </p:cTn>
+                              </p:par>
+                            </p:childTnLst>
+                          </p:cTn>
+                        </p:par>
+                      </p:childTnLst>
+                    </p:cTn>
+                  </p:par>
+                  <p:par>
+                    <p:cTn id="9" fill="hold">
+                      <p:stCondLst>
+                        <p:cond delay="indefinite"/>
+                      </p:stCondLst>
+                      <p:childTnLst>
+                        <p:par>
+                          <p:cTn id="10" fill="hold">
+                            <p:stCondLst>
+                              <p:cond delay="0"/>
+                            </p:stCondLst>
+                            <p:childTnLst>
+                              <p:par>
+                                <p:cTn id="11" presetID="1" presetClass="entr" presetSubtype="0" fill="hold" nodeType="clickEffect">
+                                  <p:stCondLst>
+                                    <p:cond delay="0"/>
+                                  </p:stCondLst>
+                                  <p:childTnLst>
+                                    <p:set>
+                                      <p:cBhvr>
+                                        <p:cTn id="12" dur="1" fill="hold">
+                                          <p:stCondLst>
+                                            <p:cond delay="0"/>
+                                          </p:stCondLst>
+                                        </p:cTn>
+                                        <p:tgtEl>
                                           <p:spTgt spid="5">
                                             <p:txEl>
                                               <p:pRg st="1" end="1"/>
@@ -16847,26 +17091,26 @@
                     </p:cTn>
                   </p:par>
                   <p:par>
-                    <p:cTn id="7" fill="hold">
+                    <p:cTn id="13" fill="hold">
                       <p:stCondLst>
                         <p:cond delay="indefinite"/>
                       </p:stCondLst>
                       <p:childTnLst>
                         <p:par>
-                          <p:cTn id="8" fill="hold">
+                          <p:cTn id="14" fill="hold">
                             <p:stCondLst>
                               <p:cond delay="0"/>
                             </p:stCondLst>
                             <p:childTnLst>
                               <p:par>
-                                <p:cTn id="9" presetID="1" presetClass="entr" presetSubtype="0" fill="hold" nodeType="clickEffect">
+                                <p:cTn id="15" presetID="1" presetClass="entr" presetSubtype="0" fill="hold" nodeType="clickEffect">
                                   <p:stCondLst>
                                     <p:cond delay="0"/>
                                   </p:stCondLst>
                                   <p:childTnLst>
                                     <p:set>
                                       <p:cBhvr>
-                                        <p:cTn id="10" dur="1" fill="hold">
+                                        <p:cTn id="16" dur="1" fill="hold">
                                           <p:stCondLst>
                                             <p:cond delay="0"/>
                                           </p:stCondLst>
@@ -16877,51 +17121,6 @@
                                               <p:pRg st="2" end="2"/>
                                             </p:txEl>
                                           </p:spTgt>
-                                        </p:tgtEl>
-                                        <p:attrNameLst>
-                                          <p:attrName>style.visibility</p:attrName>
-                                        </p:attrNameLst>
-                                      </p:cBhvr>
-                                      <p:to>
-                                        <p:strVal val="visible"/>
-                                      </p:to>
-                                    </p:set>
-                                  </p:childTnLst>
-                                </p:cTn>
-                              </p:par>
-                            </p:childTnLst>
-                          </p:cTn>
-                        </p:par>
-                      </p:childTnLst>
-                    </p:cTn>
-                  </p:par>
-                  <p:par>
-                    <p:cTn id="11" fill="hold">
-                      <p:stCondLst>
-                        <p:cond delay="indefinite"/>
-                      </p:stCondLst>
-                      <p:childTnLst>
-                        <p:par>
-                          <p:cTn id="12" fill="hold">
-                            <p:stCondLst>
-                              <p:cond delay="0"/>
-                            </p:stCondLst>
-                            <p:childTnLst>
-                              <p:par>
-                                <p:cTn id="13" presetID="1" presetClass="entr" presetSubtype="0" fill="hold" nodeType="clickEffect">
-                                  <p:stCondLst>
-                                    <p:cond delay="0"/>
-                                  </p:stCondLst>
-                                  <p:childTnLst>
-                                    <p:set>
-                                      <p:cBhvr>
-                                        <p:cTn id="14" dur="1" fill="hold">
-                                          <p:stCondLst>
-                                            <p:cond delay="0"/>
-                                          </p:stCondLst>
-                                        </p:cTn>
-                                        <p:tgtEl>
-                                          <p:spTgt spid="6"/>
                                         </p:tgtEl>
                                         <p:attrNameLst>
                                           <p:attrName>style.visibility</p:attrName>
@@ -16961,11 +17160,120 @@
         </p:cTn>
       </p:par>
     </p:tnLst>
+    <p:bldLst>
+      <p:bldP spid="7" grpId="0" animBg="1"/>
+    </p:bldLst>
   </p:timing>
 </p:sld>
 </file>
 
 <file path=ppt/slides/slide5.xml><?xml version="1.0" encoding="utf-8"?>
+<p:sld xmlns:a="http://schemas.openxmlformats.org/drawingml/2006/main" xmlns:r="http://schemas.openxmlformats.org/officeDocument/2006/relationships" xmlns:p="http://schemas.openxmlformats.org/presentationml/2006/main">
+  <p:cSld>
+    <p:spTree>
+      <p:nvGrpSpPr>
+        <p:cNvPr id="1" name=""/>
+        <p:cNvGrpSpPr/>
+        <p:nvPr/>
+      </p:nvGrpSpPr>
+      <p:grpSpPr>
+        <a:xfrm>
+          <a:off x="0" y="0"/>
+          <a:ext cx="0" cy="0"/>
+          <a:chOff x="0" y="0"/>
+          <a:chExt cx="0" cy="0"/>
+        </a:xfrm>
+      </p:grpSpPr>
+      <p:sp>
+        <p:nvSpPr>
+          <p:cNvPr id="4" name="Title 3"/>
+          <p:cNvSpPr>
+            <a:spLocks noGrp="1"/>
+          </p:cNvSpPr>
+          <p:nvPr>
+            <p:ph type="title"/>
+          </p:nvPr>
+        </p:nvSpPr>
+        <p:spPr/>
+        <p:txBody>
+          <a:bodyPr/>
+          <a:lstStyle/>
+          <a:p>
+            <a:r>
+              <a:rPr lang="bg-BG" dirty="0"/>
+              <a:t>Въвеждане на текст</a:t>
+            </a:r>
+            <a:r>
+              <a:rPr lang="en-US" dirty="0"/>
+              <a:t> </a:t>
+            </a:r>
+            <a:r>
+              <a:rPr lang="bg-BG" dirty="0"/>
+              <a:t>– пример</a:t>
+            </a:r>
+            <a:endParaRPr lang="en-US" dirty="0"/>
+          </a:p>
+        </p:txBody>
+      </p:sp>
+      <p:pic>
+        <p:nvPicPr>
+          <p:cNvPr id="6" name="Picture 5"/>
+          <p:cNvPicPr>
+            <a:picLocks noChangeAspect="1"/>
+          </p:cNvPicPr>
+          <p:nvPr/>
+        </p:nvPicPr>
+        <p:blipFill>
+          <a:blip r:embed="rId2">
+            <a:extLst>
+              <a:ext uri="{28A0092B-C50C-407E-A947-70E740481C1C}">
+                <a14:useLocalDpi xmlns:a14="http://schemas.microsoft.com/office/drawing/2010/main" val="0"/>
+              </a:ext>
+            </a:extLst>
+          </a:blip>
+          <a:stretch>
+            <a:fillRect/>
+          </a:stretch>
+        </p:blipFill>
+        <p:spPr>
+          <a:xfrm>
+            <a:off x="1271667" y="1404000"/>
+            <a:ext cx="9648665" cy="5217873"/>
+          </a:xfrm>
+          <a:prstGeom prst="rect">
+            <a:avLst/>
+          </a:prstGeom>
+          <a:ln>
+            <a:solidFill>
+              <a:schemeClr val="bg2">
+                <a:lumMod val="75000"/>
+              </a:schemeClr>
+            </a:solidFill>
+          </a:ln>
+        </p:spPr>
+      </p:pic>
+    </p:spTree>
+    <p:extLst>
+      <p:ext uri="{BB962C8B-B14F-4D97-AF65-F5344CB8AC3E}">
+        <p14:creationId xmlns:p14="http://schemas.microsoft.com/office/powerpoint/2010/main" val="2230002518"/>
+      </p:ext>
+    </p:extLst>
+  </p:cSld>
+  <p:clrMapOvr>
+    <a:masterClrMapping/>
+  </p:clrMapOvr>
+  <mc:AlternateContent xmlns:mc="http://schemas.openxmlformats.org/markup-compatibility/2006">
+    <mc:Choice xmlns:p14="http://schemas.microsoft.com/office/powerpoint/2010/main" Requires="p14">
+      <p:transition spd="slow" p14:dur="2000" advClick="0" advTm="5000"/>
+    </mc:Choice>
+    <mc:Fallback>
+      <p:transition spd="slow" advClick="0" advTm="5000"/>
+    </mc:Fallback>
+  </mc:AlternateContent>
+</p:sld>
+</file>
+
+<file path=ppt/slides/slide6.xml><?xml version="1.0" encoding="utf-8"?>
 <p:sld xmlns:a="http://schemas.openxmlformats.org/drawingml/2006/main" xmlns:r="http://schemas.openxmlformats.org/officeDocument/2006/relationships" xmlns:p="http://schemas.openxmlformats.org/presentationml/2006/main">
   <p:cSld>
     <p:spTree>
@@ -17000,7 +17308,7 @@
             <a:fld id="{2BF067CD-8E6B-4360-9AA8-C5DF2A48A6D1}" type="slidenum">
               <a:rPr lang="en-US" noProof="0" smtClean="0"/>
               <a:pPr/>
-              <a:t>5</a:t>
+              <a:t>6</a:t>
             </a:fld>
             <a:endParaRPr lang="en-US" noProof="0" dirty="0"/>
           </a:p>
@@ -17616,33 +17924,15 @@
                                   </p:childTnLst>
                                 </p:cTn>
                               </p:par>
-                            </p:childTnLst>
-                          </p:cTn>
-                        </p:par>
-                      </p:childTnLst>
-                    </p:cTn>
-                  </p:par>
-                  <p:par>
-                    <p:cTn id="15" fill="hold">
-                      <p:stCondLst>
-                        <p:cond delay="indefinite"/>
-                      </p:stCondLst>
-                      <p:childTnLst>
-                        <p:par>
-                          <p:cTn id="16" fill="hold">
-                            <p:stCondLst>
-                              <p:cond delay="0"/>
-                            </p:stCondLst>
-                            <p:childTnLst>
                               <p:par>
-                                <p:cTn id="17" presetID="1" presetClass="entr" presetSubtype="0" fill="hold" grpId="0" nodeType="clickEffect">
+                                <p:cTn id="15" presetID="1" presetClass="entr" presetSubtype="0" fill="hold" grpId="0" nodeType="withEffect">
                                   <p:stCondLst>
                                     <p:cond delay="0"/>
                                   </p:stCondLst>
                                   <p:childTnLst>
                                     <p:set>
                                       <p:cBhvr>
-                                        <p:cTn id="18" dur="1" fill="hold">
+                                        <p:cTn id="16" dur="1" fill="hold">
                                           <p:stCondLst>
                                             <p:cond delay="0"/>
                                           </p:stCondLst>
@@ -17698,7 +17988,7 @@
 </p:sld>
 </file>
 
-<file path=ppt/slides/slide6.xml><?xml version="1.0" encoding="utf-8"?>
+<file path=ppt/slides/slide7.xml><?xml version="1.0" encoding="utf-8"?>
 <p:sld xmlns:a="http://schemas.openxmlformats.org/drawingml/2006/main" xmlns:r="http://schemas.openxmlformats.org/officeDocument/2006/relationships" xmlns:p="http://schemas.openxmlformats.org/presentationml/2006/main">
   <p:cSld>
     <p:spTree>
@@ -17733,7 +18023,7 @@
             <a:fld id="{2BF067CD-8E6B-4360-9AA8-C5DF2A48A6D1}" type="slidenum">
               <a:rPr lang="en-US" noProof="0" smtClean="0"/>
               <a:pPr/>
-              <a:t>6</a:t>
+              <a:t>7</a:t>
             </a:fld>
             <a:endParaRPr lang="en-US" noProof="0" dirty="0"/>
           </a:p>
@@ -17860,6 +18150,13 @@
           <a:prstGeom prst="rect">
             <a:avLst/>
           </a:prstGeom>
+          <a:ln>
+            <a:solidFill>
+              <a:schemeClr val="bg2">
+                <a:lumMod val="75000"/>
+              </a:schemeClr>
+            </a:solidFill>
+          </a:ln>
         </p:spPr>
       </p:pic>
       <p:sp>
@@ -17979,8 +18276,8 @@
           </a:xfrm>
           <a:prstGeom prst="wedgeRoundRectCallout">
             <a:avLst>
-              <a:gd name="adj1" fmla="val -63488"/>
-              <a:gd name="adj2" fmla="val 123954"/>
+              <a:gd name="adj1" fmla="val -68055"/>
+              <a:gd name="adj2" fmla="val 133200"/>
               <a:gd name="adj3" fmla="val 16667"/>
             </a:avLst>
           </a:prstGeom>
@@ -18215,7 +18512,7 @@
 </p:sld>
 </file>
 
-<file path=ppt/slides/slide7.xml><?xml version="1.0" encoding="utf-8"?>
+<file path=ppt/slides/slide8.xml><?xml version="1.0" encoding="utf-8"?>
 <p:sld xmlns:a="http://schemas.openxmlformats.org/drawingml/2006/main" xmlns:r="http://schemas.openxmlformats.org/officeDocument/2006/relationships" xmlns:p="http://schemas.openxmlformats.org/presentationml/2006/main">
   <p:cSld>
     <p:spTree>
@@ -18250,7 +18547,7 @@
             <a:fld id="{2BF067CD-8E6B-4360-9AA8-C5DF2A48A6D1}" type="slidenum">
               <a:rPr lang="en-US" noProof="0" smtClean="0"/>
               <a:pPr/>
-              <a:t>7</a:t>
+              <a:t>8</a:t>
             </a:fld>
             <a:endParaRPr lang="en-US" noProof="0" dirty="0"/>
           </a:p>
@@ -18457,8 +18754,8 @@
         </p:blipFill>
         <p:spPr>
           <a:xfrm>
-            <a:off x="5290209" y="4957390"/>
-            <a:ext cx="1618481" cy="1549610"/>
+            <a:off x="5916000" y="4374000"/>
+            <a:ext cx="1755000" cy="1680320"/>
           </a:xfrm>
           <a:prstGeom prst="rect">
             <a:avLst/>
@@ -18666,248 +18963,6 @@
 </p:sld>
 </file>
 
-<file path=ppt/slides/slide8.xml><?xml version="1.0" encoding="utf-8"?>
-<p:sld xmlns:a="http://schemas.openxmlformats.org/drawingml/2006/main" xmlns:r="http://schemas.openxmlformats.org/officeDocument/2006/relationships" xmlns:p="http://schemas.openxmlformats.org/presentationml/2006/main">
-  <p:cSld>
-    <p:spTree>
-      <p:nvGrpSpPr>
-        <p:cNvPr id="1" name=""/>
-        <p:cNvGrpSpPr/>
-        <p:nvPr/>
-      </p:nvGrpSpPr>
-      <p:grpSpPr>
-        <a:xfrm>
-          <a:off x="0" y="0"/>
-          <a:ext cx="0" cy="0"/>
-          <a:chOff x="0" y="0"/>
-          <a:chExt cx="0" cy="0"/>
-        </a:xfrm>
-      </p:grpSpPr>
-      <p:sp>
-        <p:nvSpPr>
-          <p:cNvPr id="2" name="Slide Number Placeholder 1"/>
-          <p:cNvSpPr>
-            <a:spLocks noGrp="1"/>
-          </p:cNvSpPr>
-          <p:nvPr>
-            <p:ph type="sldNum" sz="quarter" idx="5"/>
-          </p:nvPr>
-        </p:nvSpPr>
-        <p:spPr/>
-        <p:txBody>
-          <a:bodyPr/>
-          <a:lstStyle/>
-          <a:p>
-            <a:fld id="{2BF067CD-8E6B-4360-9AA8-C5DF2A48A6D1}" type="slidenum">
-              <a:rPr lang="en-US" noProof="0" smtClean="0"/>
-              <a:pPr/>
-              <a:t>8</a:t>
-            </a:fld>
-            <a:endParaRPr lang="en-US" noProof="0" dirty="0"/>
-          </a:p>
-        </p:txBody>
-      </p:sp>
-      <p:sp>
-        <p:nvSpPr>
-          <p:cNvPr id="3" name="Text Placeholder 2"/>
-          <p:cNvSpPr>
-            <a:spLocks noGrp="1"/>
-          </p:cNvSpPr>
-          <p:nvPr>
-            <p:ph type="body" sz="quarter" idx="10"/>
-          </p:nvPr>
-        </p:nvSpPr>
-        <p:spPr/>
-        <p:txBody>
-          <a:bodyPr/>
-          <a:lstStyle/>
-          <a:p>
-            <a:r>
-              <a:rPr lang="bg-BG" dirty="0"/>
-              <a:t>Отворете </a:t>
-            </a:r>
-            <a:r>
-              <a:rPr lang="bg-BG" b="1" dirty="0"/>
-              <a:t>програмата </a:t>
-            </a:r>
-            <a:r>
-              <a:rPr lang="en-US" b="1" dirty="0">
-                <a:solidFill>
-                  <a:schemeClr val="bg1"/>
-                </a:solidFill>
-              </a:rPr>
-              <a:t>Paint</a:t>
-            </a:r>
-            <a:r>
-              <a:rPr lang="bg-BG" dirty="0"/>
-              <a:t>. Изчертайте фигурите: </a:t>
-            </a:r>
-            <a:r>
-              <a:rPr lang="bg-BG" b="1" dirty="0"/>
-              <a:t>триъгълник</a:t>
-            </a:r>
-            <a:r>
-              <a:rPr lang="bg-BG" dirty="0"/>
-              <a:t>, </a:t>
-            </a:r>
-            <a:r>
-              <a:rPr lang="bg-BG" b="1" dirty="0"/>
-              <a:t>квадрат</a:t>
-            </a:r>
-            <a:r>
-              <a:rPr lang="bg-BG" dirty="0"/>
-              <a:t>, </a:t>
-            </a:r>
-            <a:r>
-              <a:rPr lang="bg-BG" b="1" dirty="0"/>
-              <a:t>правоъгълник</a:t>
-            </a:r>
-            <a:r>
-              <a:rPr lang="bg-BG" dirty="0"/>
-              <a:t>, </a:t>
-            </a:r>
-            <a:r>
-              <a:rPr lang="bg-BG" b="1" dirty="0"/>
-              <a:t>окръжност</a:t>
-            </a:r>
-            <a:r>
-              <a:rPr lang="bg-BG" dirty="0"/>
-              <a:t>. Всяка фигура трябва да е </a:t>
-            </a:r>
-            <a:r>
-              <a:rPr lang="bg-BG" b="1" dirty="0"/>
-              <a:t>запълнена</a:t>
-            </a:r>
-            <a:r>
-              <a:rPr lang="bg-BG" dirty="0"/>
-              <a:t> с </a:t>
-            </a:r>
-            <a:r>
-              <a:rPr lang="bg-BG" b="1" dirty="0"/>
-              <a:t>различен цвят</a:t>
-            </a:r>
-            <a:r>
-              <a:rPr lang="bg-BG" dirty="0"/>
-              <a:t>. Добавете </a:t>
-            </a:r>
-            <a:r>
-              <a:rPr lang="bg-BG" b="1" dirty="0"/>
-              <a:t>името</a:t>
-            </a:r>
-            <a:r>
-              <a:rPr lang="bg-BG" dirty="0"/>
-              <a:t> на </a:t>
-            </a:r>
-            <a:r>
-              <a:rPr lang="bg-BG" b="1" dirty="0"/>
-              <a:t>всяка фигура </a:t>
-            </a:r>
-            <a:r>
-              <a:rPr lang="bg-BG" dirty="0"/>
-              <a:t>под нея, като </a:t>
-            </a:r>
-            <a:r>
-              <a:rPr lang="bg-BG" b="1" dirty="0"/>
-              <a:t>цвета</a:t>
-            </a:r>
-            <a:r>
-              <a:rPr lang="bg-BG" dirty="0"/>
-              <a:t> на </a:t>
-            </a:r>
-            <a:r>
-              <a:rPr lang="bg-BG" b="1" dirty="0"/>
-              <a:t>текста</a:t>
-            </a:r>
-            <a:r>
-              <a:rPr lang="bg-BG" dirty="0"/>
-              <a:t> съответства с този, който е </a:t>
-            </a:r>
-            <a:r>
-              <a:rPr lang="bg-BG" b="1" dirty="0"/>
-              <a:t>запълнена фигурата</a:t>
-            </a:r>
-            <a:r>
-              <a:rPr lang="bg-BG" dirty="0"/>
-              <a:t>.</a:t>
-            </a:r>
-            <a:endParaRPr lang="en-US" dirty="0"/>
-          </a:p>
-        </p:txBody>
-      </p:sp>
-      <p:sp>
-        <p:nvSpPr>
-          <p:cNvPr id="4" name="Title 3"/>
-          <p:cNvSpPr>
-            <a:spLocks noGrp="1"/>
-          </p:cNvSpPr>
-          <p:nvPr>
-            <p:ph type="title"/>
-          </p:nvPr>
-        </p:nvSpPr>
-        <p:spPr/>
-        <p:txBody>
-          <a:bodyPr/>
-          <a:lstStyle/>
-          <a:p>
-            <a:r>
-              <a:rPr lang="bg-BG" dirty="0"/>
-              <a:t>Задача: Фигури</a:t>
-            </a:r>
-            <a:endParaRPr lang="en-US" dirty="0"/>
-          </a:p>
-        </p:txBody>
-      </p:sp>
-      <p:pic>
-        <p:nvPicPr>
-          <p:cNvPr id="5" name="Picture 4"/>
-          <p:cNvPicPr>
-            <a:picLocks noChangeAspect="1"/>
-          </p:cNvPicPr>
-          <p:nvPr/>
-        </p:nvPicPr>
-        <p:blipFill>
-          <a:blip r:embed="rId2">
-            <a:extLst>
-              <a:ext uri="{28A0092B-C50C-407E-A947-70E740481C1C}">
-                <a14:useLocalDpi xmlns:a14="http://schemas.microsoft.com/office/drawing/2010/main" val="0"/>
-              </a:ext>
-            </a:extLst>
-          </a:blip>
-          <a:stretch>
-            <a:fillRect/>
-          </a:stretch>
-        </p:blipFill>
-        <p:spPr>
-          <a:xfrm>
-            <a:off x="4840619" y="4110407"/>
-            <a:ext cx="2510763" cy="2416609"/>
-          </a:xfrm>
-          <a:prstGeom prst="rect">
-            <a:avLst/>
-          </a:prstGeom>
-        </p:spPr>
-      </p:pic>
-    </p:spTree>
-    <p:extLst>
-      <p:ext uri="{BB962C8B-B14F-4D97-AF65-F5344CB8AC3E}">
-        <p14:creationId xmlns:p14="http://schemas.microsoft.com/office/powerpoint/2010/main" val="2925279938"/>
-      </p:ext>
-    </p:extLst>
-  </p:cSld>
-  <p:clrMapOvr>
-    <a:masterClrMapping/>
-  </p:clrMapOvr>
-  <mc:AlternateContent xmlns:mc="http://schemas.openxmlformats.org/markup-compatibility/2006" xmlns:p14="http://schemas.microsoft.com/office/powerpoint/2010/main">
-    <mc:Choice Requires="p14">
-      <p:transition spd="slow" p14:dur="2000" advClick="0" advTm="5000"/>
-    </mc:Choice>
-    <mc:Fallback xmlns="">
-      <p:transition spd="slow" advClick="0" advTm="5000"/>
-    </mc:Fallback>
-  </mc:AlternateContent>
-</p:sld>
-</file>
-
 <file path=ppt/slides/slide9.xml><?xml version="1.0" encoding="utf-8"?>
 <p:sld xmlns:a="http://schemas.openxmlformats.org/drawingml/2006/main" xmlns:r="http://schemas.openxmlformats.org/officeDocument/2006/relationships" xmlns:p="http://schemas.openxmlformats.org/presentationml/2006/main">
   <p:cSld>
@@ -18970,55 +19025,7 @@
             </a:r>
             <a:r>
               <a:rPr lang="bg-BG" b="1" dirty="0"/>
-              <a:t>изображението</a:t>
-            </a:r>
-            <a:r>
-              <a:rPr lang="bg-BG" dirty="0"/>
-              <a:t> </a:t>
-            </a:r>
-            <a:r>
-              <a:rPr lang="en-US" b="1" dirty="0">
-                <a:solidFill>
-                  <a:schemeClr val="bg1"/>
-                </a:solidFill>
-              </a:rPr>
-              <a:t>sign.jpg </a:t>
-            </a:r>
-            <a:r>
-              <a:rPr lang="bg-BG" dirty="0"/>
-              <a:t>в </a:t>
-            </a:r>
-            <a:r>
-              <a:rPr lang="bg-BG" b="1" dirty="0"/>
-              <a:t>папката </a:t>
-            </a:r>
-            <a:r>
-              <a:rPr lang="en-US" b="1">
-                <a:solidFill>
-                  <a:schemeClr val="bg1"/>
-                </a:solidFill>
-              </a:rPr>
-              <a:t>Resources</a:t>
-            </a:r>
-            <a:r>
-              <a:rPr lang="en-US" b="1"/>
-              <a:t> </a:t>
-            </a:r>
-            <a:r>
-              <a:rPr lang="bg-BG"/>
-              <a:t>и </a:t>
-            </a:r>
-            <a:r>
-              <a:rPr lang="bg-BG" dirty="0"/>
-              <a:t>го </a:t>
-            </a:r>
-            <a:r>
-              <a:rPr lang="bg-BG" b="1" dirty="0"/>
-              <a:t>пресъздайте</a:t>
-            </a:r>
-            <a:r>
-              <a:rPr lang="bg-BG" dirty="0"/>
-              <a:t> в </a:t>
+              <a:t>програмата </a:t>
             </a:r>
             <a:r>
               <a:rPr lang="en-US" b="1" dirty="0">
@@ -19029,20 +19036,98 @@
               <a:t>Paint</a:t>
             </a:r>
             <a:r>
-              <a:rPr lang="en-US" dirty="0"/>
+              <a:rPr lang="bg-BG" dirty="0"/>
+              <a:t>. Изчертайте фигурите: </a:t>
+            </a:r>
+            <a:r>
+              <a:rPr lang="bg-BG" b="1" dirty="0"/>
+              <a:t>триъгълник</a:t>
+            </a:r>
+            <a:r>
+              <a:rPr lang="bg-BG" dirty="0"/>
               <a:t>, </a:t>
             </a:r>
             <a:r>
+              <a:rPr lang="bg-BG" b="1" dirty="0"/>
+              <a:t>квадрат</a:t>
+            </a:r>
+            <a:r>
               <a:rPr lang="bg-BG" dirty="0"/>
-              <a:t>като използвате </a:t>
+              <a:t>, </a:t>
             </a:r>
             <a:r>
               <a:rPr lang="bg-BG" b="1" dirty="0"/>
-              <a:t>подходящите инстументи</a:t>
+              <a:t>правоъгълник</a:t>
             </a:r>
             <a:r>
               <a:rPr lang="bg-BG" dirty="0"/>
-              <a:t>.</a:t>
+              <a:t>, </a:t>
+            </a:r>
+            <a:r>
+              <a:rPr lang="bg-BG" b="1" dirty="0"/>
+              <a:t>окръжност</a:t>
+            </a:r>
+            <a:endParaRPr lang="en-US" dirty="0"/>
+          </a:p>
+          <a:p>
+            <a:r>
+              <a:rPr lang="bg-BG" dirty="0"/>
+              <a:t>Всяка фигура трябва да е </a:t>
+            </a:r>
+            <a:r>
+              <a:rPr lang="bg-BG" b="1" dirty="0"/>
+              <a:t>запълнена</a:t>
+            </a:r>
+            <a:r>
+              <a:rPr lang="bg-BG" dirty="0"/>
+              <a:t> с </a:t>
+            </a:r>
+            <a:r>
+              <a:rPr lang="bg-BG" b="1" dirty="0"/>
+              <a:t>различен цвят</a:t>
+            </a:r>
+            <a:endParaRPr lang="en-US" dirty="0"/>
+          </a:p>
+          <a:p>
+            <a:r>
+              <a:rPr lang="bg-BG" dirty="0"/>
+              <a:t>Добавете </a:t>
+            </a:r>
+            <a:r>
+              <a:rPr lang="bg-BG" b="1" dirty="0"/>
+              <a:t>името</a:t>
+            </a:r>
+            <a:r>
+              <a:rPr lang="bg-BG" dirty="0"/>
+              <a:t> на </a:t>
+            </a:r>
+            <a:r>
+              <a:rPr lang="bg-BG" b="1" dirty="0"/>
+              <a:t>всяка фигура </a:t>
+            </a:r>
+            <a:r>
+              <a:rPr lang="bg-BG" dirty="0"/>
+              <a:t>под нея, като </a:t>
+            </a:r>
+            <a:r>
+              <a:rPr lang="bg-BG" b="1" dirty="0"/>
+              <a:t>цветът</a:t>
+            </a:r>
+            <a:r>
+              <a:rPr lang="bg-BG" dirty="0"/>
+              <a:t> на </a:t>
+            </a:r>
+            <a:r>
+              <a:rPr lang="bg-BG" b="1" dirty="0"/>
+              <a:t>текста</a:t>
+            </a:r>
+            <a:r>
+              <a:rPr lang="bg-BG" dirty="0"/>
+              <a:t> съответства с този, с който е </a:t>
+            </a:r>
+            <a:r>
+              <a:rPr lang="bg-BG" b="1" dirty="0"/>
+              <a:t>запълнена фигурата</a:t>
             </a:r>
             <a:endParaRPr lang="en-US" dirty="0"/>
           </a:p>
@@ -19065,7 +19150,7 @@
           <a:p>
             <a:r>
               <a:rPr lang="bg-BG" dirty="0"/>
-              <a:t>Задача: Пътен знак</a:t>
+              <a:t>Задача: Фигури</a:t>
             </a:r>
             <a:endParaRPr lang="en-US" dirty="0"/>
           </a:p>
@@ -19080,7 +19165,7 @@
           <p:nvPr/>
         </p:nvPicPr>
         <p:blipFill>
-          <a:blip r:embed="rId2" cstate="hqprint">
+          <a:blip r:embed="rId2">
             <a:extLst>
               <a:ext uri="{28A0092B-C50C-407E-A947-70E740481C1C}">
                 <a14:useLocalDpi xmlns:a14="http://schemas.microsoft.com/office/drawing/2010/main" val="0"/>
@@ -19093,8 +19178,8 @@
         </p:blipFill>
         <p:spPr>
           <a:xfrm>
-            <a:off x="3787500" y="2934000"/>
-            <a:ext cx="4617000" cy="3462750"/>
+            <a:off x="4840619" y="4297391"/>
+            <a:ext cx="2510763" cy="2416609"/>
           </a:xfrm>
           <a:prstGeom prst="rect">
             <a:avLst/>
@@ -19104,7 +19189,7 @@
     </p:spTree>
     <p:extLst>
       <p:ext uri="{BB962C8B-B14F-4D97-AF65-F5344CB8AC3E}">
-        <p14:creationId xmlns:p14="http://schemas.microsoft.com/office/powerpoint/2010/main" val="1316119170"/>
+        <p14:creationId xmlns:p14="http://schemas.microsoft.com/office/powerpoint/2010/main" val="2925279938"/>
       </p:ext>
     </p:extLst>
   </p:cSld>
@@ -19119,6 +19204,134 @@
       <p:transition spd="slow" advClick="0" advTm="5000"/>
     </mc:Fallback>
   </mc:AlternateContent>
+  <p:timing>
+    <p:tnLst>
+      <p:par>
+        <p:cTn id="1" dur="indefinite" restart="never" nodeType="tmRoot">
+          <p:childTnLst>
+            <p:seq concurrent="1" nextAc="seek">
+              <p:cTn id="2" dur="indefinite" nodeType="mainSeq">
+                <p:childTnLst>
+                  <p:par>
+                    <p:cTn id="3" fill="hold">
+                      <p:stCondLst>
+                        <p:cond delay="indefinite"/>
+                      </p:stCondLst>
+                      <p:childTnLst>
+                        <p:par>
+                          <p:cTn id="4" fill="hold">
+                            <p:stCondLst>
+                              <p:cond delay="0"/>
+                            </p:stCondLst>
+                            <p:childTnLst>
+                              <p:par>
+                                <p:cTn id="5" presetID="1" presetClass="entr" presetSubtype="0" fill="hold" nodeType="clickEffect">
+                                  <p:stCondLst>
+                                    <p:cond delay="0"/>
+                                  </p:stCondLst>
+                                  <p:childTnLst>
+                                    <p:set>
+                                      <p:cBhvr>
+                                        <p:cTn id="6" dur="1" fill="hold">
+                                          <p:stCondLst>
+                                            <p:cond delay="0"/>
+                                          </p:stCondLst>
+                                        </p:cTn>
+                                        <p:tgtEl>
+                                          <p:spTgt spid="3">
+                                            <p:txEl>
+                                              <p:pRg st="1" end="1"/>
+                                            </p:txEl>
+                                          </p:spTgt>
+                                        </p:tgtEl>
+                                        <p:attrNameLst>
+                                          <p:attrName>style.visibility</p:attrName>
+                                        </p:attrNameLst>
+                                      </p:cBhvr>
+                                      <p:to>
+                                        <p:strVal val="visible"/>
+                                      </p:to>
+                                    </p:set>
+                                  </p:childTnLst>
+                                </p:cTn>
+                              </p:par>
+                            </p:childTnLst>
+                          </p:cTn>
+                        </p:par>
+                      </p:childTnLst>
+                    </p:cTn>
+                  </p:par>
+                  <p:par>
+                    <p:cTn id="7" fill="hold">
+                      <p:stCondLst>
+                        <p:cond delay="indefinite"/>
+                      </p:stCondLst>
+                      <p:childTnLst>
+                        <p:par>
+                          <p:cTn id="8" fill="hold">
+                            <p:stCondLst>
+                              <p:cond delay="0"/>
+                            </p:stCondLst>
+                            <p:childTnLst>
+                              <p:par>
+                                <p:cTn id="9" presetID="1" presetClass="entr" presetSubtype="0" fill="hold" nodeType="clickEffect">
+                                  <p:stCondLst>
+                                    <p:cond delay="0"/>
+                                  </p:stCondLst>
+                                  <p:childTnLst>
+                                    <p:set>
+                                      <p:cBhvr>
+                                        <p:cTn id="10" dur="1" fill="hold">
+                                          <p:stCondLst>
+                                            <p:cond delay="0"/>
+                                          </p:stCondLst>
+                                        </p:cTn>
+                                        <p:tgtEl>
+                                          <p:spTgt spid="3">
+                                            <p:txEl>
+                                              <p:pRg st="2" end="2"/>
+                                            </p:txEl>
+                                          </p:spTgt>
+                                        </p:tgtEl>
+                                        <p:attrNameLst>
+                                          <p:attrName>style.visibility</p:attrName>
+                                        </p:attrNameLst>
+                                      </p:cBhvr>
+                                      <p:to>
+                                        <p:strVal val="visible"/>
+                                      </p:to>
+                                    </p:set>
+                                  </p:childTnLst>
+                                </p:cTn>
+                              </p:par>
+                            </p:childTnLst>
+                          </p:cTn>
+                        </p:par>
+                      </p:childTnLst>
+                    </p:cTn>
+                  </p:par>
+                </p:childTnLst>
+              </p:cTn>
+              <p:prevCondLst>
+                <p:cond evt="onPrev" delay="0">
+                  <p:tgtEl>
+                    <p:sldTgt/>
+                  </p:tgtEl>
+                </p:cond>
+              </p:prevCondLst>
+              <p:nextCondLst>
+                <p:cond evt="onNext" delay="0">
+                  <p:tgtEl>
+                    <p:sldTgt/>
+                  </p:tgtEl>
+                </p:cond>
+              </p:nextCondLst>
+            </p:seq>
+          </p:childTnLst>
+        </p:cTn>
+      </p:par>
+    </p:tnLst>
+  </p:timing>
 </p:sld>
 </file>
 

</xml_diff>